<commit_message>
added bar py file
</commit_message>
<xml_diff>
--- a/Atlanta Traffic PPT.pptx
+++ b/Atlanta Traffic PPT.pptx
@@ -5,25 +5,33 @@
     <p:sldMasterId id="2147483660" r:id="rId1"/>
   </p:sldMasterIdLst>
   <p:notesMasterIdLst>
-    <p:notesMasterId r:id="rId4"/>
+    <p:notesMasterId r:id="rId12"/>
   </p:notesMasterIdLst>
   <p:sldIdLst>
     <p:sldId id="259" r:id="rId2"/>
     <p:sldId id="257" r:id="rId3"/>
+    <p:sldId id="261" r:id="rId4"/>
+    <p:sldId id="262" r:id="rId5"/>
+    <p:sldId id="269" r:id="rId6"/>
+    <p:sldId id="264" r:id="rId7"/>
+    <p:sldId id="265" r:id="rId8"/>
+    <p:sldId id="266" r:id="rId9"/>
+    <p:sldId id="267" r:id="rId10"/>
+    <p:sldId id="268" r:id="rId11"/>
   </p:sldIdLst>
   <p:sldSz cx="9144000" cy="6858000" type="screen4x3"/>
   <p:notesSz cx="6858000" cy="9144000"/>
   <p:embeddedFontLst>
     <p:embeddedFont>
       <p:font typeface="Calibri" panose="020F0502020204030204" pitchFamily="34" charset="0"/>
-      <p:regular r:id="rId5"/>
-      <p:bold r:id="rId6"/>
-      <p:italic r:id="rId7"/>
-      <p:boldItalic r:id="rId8"/>
+      <p:regular r:id="rId13"/>
+      <p:bold r:id="rId14"/>
+      <p:italic r:id="rId15"/>
+      <p:boldItalic r:id="rId16"/>
     </p:embeddedFont>
     <p:embeddedFont>
       <p:font typeface="Sans Condensed" panose="020BE200000000000000"/>
-      <p:bold r:id="rId9"/>
+      <p:bold r:id="rId17"/>
     </p:embeddedFont>
   </p:embeddedFontLst>
   <p:defaultTextStyle>
@@ -261,7 +269,7 @@
               <a:pPr>
                 <a:defRPr/>
               </a:pPr>
-              <a:t>7/4/2020</a:t>
+              <a:t>7/6/2020</a:t>
             </a:fld>
             <a:endParaRPr lang="en-US"/>
           </a:p>
@@ -567,6 +575,585 @@
 </p:notesMaster>
 </file>
 
+<file path=ppt/notesSlides/notesSlide1.xml><?xml version="1.0" encoding="utf-8"?>
+<p:notes xmlns:a="http://schemas.openxmlformats.org/drawingml/2006/main" xmlns:r="http://schemas.openxmlformats.org/officeDocument/2006/relationships" xmlns:p="http://schemas.openxmlformats.org/presentationml/2006/main">
+  <p:cSld>
+    <p:spTree>
+      <p:nvGrpSpPr>
+        <p:cNvPr id="1" name=""/>
+        <p:cNvGrpSpPr/>
+        <p:nvPr/>
+      </p:nvGrpSpPr>
+      <p:grpSpPr>
+        <a:xfrm>
+          <a:off x="0" y="0"/>
+          <a:ext cx="0" cy="0"/>
+          <a:chOff x="0" y="0"/>
+          <a:chExt cx="0" cy="0"/>
+        </a:xfrm>
+      </p:grpSpPr>
+      <p:sp>
+        <p:nvSpPr>
+          <p:cNvPr id="2" name="Slide Image Placeholder 1"/>
+          <p:cNvSpPr>
+            <a:spLocks noGrp="1" noRot="1" noChangeAspect="1"/>
+          </p:cNvSpPr>
+          <p:nvPr>
+            <p:ph type="sldImg"/>
+          </p:nvPr>
+        </p:nvSpPr>
+        <p:spPr/>
+      </p:sp>
+      <p:sp>
+        <p:nvSpPr>
+          <p:cNvPr id="3" name="Notes Placeholder 2"/>
+          <p:cNvSpPr>
+            <a:spLocks noGrp="1"/>
+          </p:cNvSpPr>
+          <p:nvPr>
+            <p:ph type="body" idx="1"/>
+          </p:nvPr>
+        </p:nvSpPr>
+        <p:spPr/>
+        <p:txBody>
+          <a:bodyPr/>
+          <a:lstStyle/>
+          <a:p>
+            <a:r>
+              <a:rPr lang="en-US" dirty="0"/>
+              <a:t>Motivation &amp; Summary Slide  * Define the core message or hypothesis of your project. * Describe the questions you asked, and _why_ you asked them</a:t>
+            </a:r>
+            <a:br>
+              <a:rPr lang="en-US" dirty="0"/>
+            </a:br>
+            <a:r>
+              <a:rPr lang="en-US" dirty="0"/>
+              <a:t>  * Describe whether you were able to answer these questions to your satisfaction, and briefly summarize your findings.</a:t>
+            </a:r>
+            <a:br>
+              <a:rPr lang="en-US" dirty="0"/>
+            </a:br>
+            <a:endParaRPr lang="en-US" dirty="0"/>
+          </a:p>
+        </p:txBody>
+      </p:sp>
+      <p:sp>
+        <p:nvSpPr>
+          <p:cNvPr id="4" name="Slide Number Placeholder 3"/>
+          <p:cNvSpPr>
+            <a:spLocks noGrp="1"/>
+          </p:cNvSpPr>
+          <p:nvPr>
+            <p:ph type="sldNum" sz="quarter" idx="5"/>
+          </p:nvPr>
+        </p:nvSpPr>
+        <p:spPr/>
+        <p:txBody>
+          <a:bodyPr/>
+          <a:lstStyle/>
+          <a:p>
+            <a:fld id="{F2AA9531-316C-4165-8E90-F2F48CBAD168}" type="slidenum">
+              <a:rPr lang="en-US" altLang="en-US" smtClean="0"/>
+              <a:pPr/>
+              <a:t>2</a:t>
+            </a:fld>
+            <a:endParaRPr lang="en-US" altLang="en-US"/>
+          </a:p>
+        </p:txBody>
+      </p:sp>
+    </p:spTree>
+    <p:extLst>
+      <p:ext uri="{BB962C8B-B14F-4D97-AF65-F5344CB8AC3E}">
+        <p14:creationId xmlns:p14="http://schemas.microsoft.com/office/powerpoint/2010/main" val="3094836499"/>
+      </p:ext>
+    </p:extLst>
+  </p:cSld>
+  <p:clrMapOvr>
+    <a:masterClrMapping/>
+  </p:clrMapOvr>
+</p:notes>
+</file>
+
+<file path=ppt/notesSlides/notesSlide2.xml><?xml version="1.0" encoding="utf-8"?>
+<p:notes xmlns:a="http://schemas.openxmlformats.org/drawingml/2006/main" xmlns:r="http://schemas.openxmlformats.org/officeDocument/2006/relationships" xmlns:p="http://schemas.openxmlformats.org/presentationml/2006/main">
+  <p:cSld>
+    <p:spTree>
+      <p:nvGrpSpPr>
+        <p:cNvPr id="1" name=""/>
+        <p:cNvGrpSpPr/>
+        <p:nvPr/>
+      </p:nvGrpSpPr>
+      <p:grpSpPr>
+        <a:xfrm>
+          <a:off x="0" y="0"/>
+          <a:ext cx="0" cy="0"/>
+          <a:chOff x="0" y="0"/>
+          <a:chExt cx="0" cy="0"/>
+        </a:xfrm>
+      </p:grpSpPr>
+      <p:sp>
+        <p:nvSpPr>
+          <p:cNvPr id="2" name="Slide Image Placeholder 1"/>
+          <p:cNvSpPr>
+            <a:spLocks noGrp="1" noRot="1" noChangeAspect="1"/>
+          </p:cNvSpPr>
+          <p:nvPr>
+            <p:ph type="sldImg"/>
+          </p:nvPr>
+        </p:nvSpPr>
+        <p:spPr/>
+      </p:sp>
+      <p:sp>
+        <p:nvSpPr>
+          <p:cNvPr id="3" name="Notes Placeholder 2"/>
+          <p:cNvSpPr>
+            <a:spLocks noGrp="1"/>
+          </p:cNvSpPr>
+          <p:nvPr>
+            <p:ph type="body" idx="1"/>
+          </p:nvPr>
+        </p:nvSpPr>
+        <p:spPr/>
+        <p:txBody>
+          <a:bodyPr/>
+          <a:lstStyle/>
+          <a:p>
+            <a:pPr marL="0" indent="0">
+              <a:buNone/>
+            </a:pPr>
+            <a:r>
+              <a:rPr lang="en-US" dirty="0"/>
+              <a:t>* Questions &amp; Data</a:t>
+            </a:r>
+            <a:br>
+              <a:rPr lang="en-US" dirty="0"/>
+            </a:br>
+            <a:br>
+              <a:rPr lang="en-US" dirty="0"/>
+            </a:br>
+            <a:r>
+              <a:rPr lang="en-US" dirty="0"/>
+              <a:t>  * Elaborate on the questions you asked, describing what kinds of data you needed to answer them, and where you found it</a:t>
+            </a:r>
+            <a:br>
+              <a:rPr lang="en-US" dirty="0"/>
+            </a:br>
+            <a:endParaRPr lang="en-US" dirty="0"/>
+          </a:p>
+          <a:p>
+            <a:pPr marL="0" indent="0">
+              <a:buNone/>
+            </a:pPr>
+            <a:br>
+              <a:rPr lang="en-US" dirty="0"/>
+            </a:br>
+            <a:endParaRPr lang="en-US" dirty="0"/>
+          </a:p>
+          <a:p>
+            <a:endParaRPr lang="en-US" dirty="0"/>
+          </a:p>
+        </p:txBody>
+      </p:sp>
+      <p:sp>
+        <p:nvSpPr>
+          <p:cNvPr id="4" name="Slide Number Placeholder 3"/>
+          <p:cNvSpPr>
+            <a:spLocks noGrp="1"/>
+          </p:cNvSpPr>
+          <p:nvPr>
+            <p:ph type="sldNum" sz="quarter" idx="5"/>
+          </p:nvPr>
+        </p:nvSpPr>
+        <p:spPr/>
+        <p:txBody>
+          <a:bodyPr/>
+          <a:lstStyle/>
+          <a:p>
+            <a:fld id="{F2AA9531-316C-4165-8E90-F2F48CBAD168}" type="slidenum">
+              <a:rPr lang="en-US" altLang="en-US" smtClean="0"/>
+              <a:pPr/>
+              <a:t>3</a:t>
+            </a:fld>
+            <a:endParaRPr lang="en-US" altLang="en-US"/>
+          </a:p>
+        </p:txBody>
+      </p:sp>
+    </p:spTree>
+    <p:extLst>
+      <p:ext uri="{BB962C8B-B14F-4D97-AF65-F5344CB8AC3E}">
+        <p14:creationId xmlns:p14="http://schemas.microsoft.com/office/powerpoint/2010/main" val="3387579408"/>
+      </p:ext>
+    </p:extLst>
+  </p:cSld>
+  <p:clrMapOvr>
+    <a:masterClrMapping/>
+  </p:clrMapOvr>
+</p:notes>
+</file>
+
+<file path=ppt/notesSlides/notesSlide3.xml><?xml version="1.0" encoding="utf-8"?>
+<p:notes xmlns:a="http://schemas.openxmlformats.org/drawingml/2006/main" xmlns:r="http://schemas.openxmlformats.org/officeDocument/2006/relationships" xmlns:p="http://schemas.openxmlformats.org/presentationml/2006/main">
+  <p:cSld>
+    <p:spTree>
+      <p:nvGrpSpPr>
+        <p:cNvPr id="1" name=""/>
+        <p:cNvGrpSpPr/>
+        <p:nvPr/>
+      </p:nvGrpSpPr>
+      <p:grpSpPr>
+        <a:xfrm>
+          <a:off x="0" y="0"/>
+          <a:ext cx="0" cy="0"/>
+          <a:chOff x="0" y="0"/>
+          <a:chExt cx="0" cy="0"/>
+        </a:xfrm>
+      </p:grpSpPr>
+      <p:sp>
+        <p:nvSpPr>
+          <p:cNvPr id="2" name="Slide Image Placeholder 1"/>
+          <p:cNvSpPr>
+            <a:spLocks noGrp="1" noRot="1" noChangeAspect="1"/>
+          </p:cNvSpPr>
+          <p:nvPr>
+            <p:ph type="sldImg"/>
+          </p:nvPr>
+        </p:nvSpPr>
+        <p:spPr/>
+      </p:sp>
+      <p:sp>
+        <p:nvSpPr>
+          <p:cNvPr id="3" name="Notes Placeholder 2"/>
+          <p:cNvSpPr>
+            <a:spLocks noGrp="1"/>
+          </p:cNvSpPr>
+          <p:nvPr>
+            <p:ph type="body" idx="1"/>
+          </p:nvPr>
+        </p:nvSpPr>
+        <p:spPr/>
+        <p:txBody>
+          <a:bodyPr/>
+          <a:lstStyle/>
+          <a:p>
+            <a:pPr marL="0" marR="0" lvl="0" indent="0" algn="l" defTabSz="914400" rtl="0" eaLnBrk="0" fontAlgn="base" latinLnBrk="0" hangingPunct="0">
+              <a:lnSpc>
+                <a:spcPct val="100000"/>
+              </a:lnSpc>
+              <a:spcBef>
+                <a:spcPct val="30000"/>
+              </a:spcBef>
+              <a:spcAft>
+                <a:spcPct val="0"/>
+              </a:spcAft>
+              <a:buClrTx/>
+              <a:buSzTx/>
+              <a:buFontTx/>
+              <a:buNone/>
+              <a:tabLst/>
+              <a:defRPr/>
+            </a:pPr>
+            <a:r>
+              <a:rPr lang="en-US" dirty="0"/>
+              <a:t>Traffic Data – Discuss the way the traffic was cleaned up and applied…..talk about how we determined the 10 zips we included in our analysis…..</a:t>
+            </a:r>
+          </a:p>
+          <a:p>
+            <a:pPr marL="0" marR="0" lvl="0" indent="0" algn="l" defTabSz="914400" rtl="0" eaLnBrk="0" fontAlgn="base" latinLnBrk="0" hangingPunct="0">
+              <a:lnSpc>
+                <a:spcPct val="100000"/>
+              </a:lnSpc>
+              <a:spcBef>
+                <a:spcPct val="30000"/>
+              </a:spcBef>
+              <a:spcAft>
+                <a:spcPct val="0"/>
+              </a:spcAft>
+              <a:buClrTx/>
+              <a:buSzTx/>
+              <a:buFontTx/>
+              <a:buNone/>
+              <a:tabLst/>
+              <a:defRPr/>
+            </a:pPr>
+            <a:endParaRPr lang="en-US" dirty="0"/>
+          </a:p>
+          <a:p>
+            <a:pPr marL="0" marR="0" lvl="0" indent="0" algn="l" defTabSz="914400" rtl="0" eaLnBrk="0" fontAlgn="base" latinLnBrk="0" hangingPunct="0">
+              <a:lnSpc>
+                <a:spcPct val="100000"/>
+              </a:lnSpc>
+              <a:spcBef>
+                <a:spcPct val="30000"/>
+              </a:spcBef>
+              <a:spcAft>
+                <a:spcPct val="0"/>
+              </a:spcAft>
+              <a:buClrTx/>
+              <a:buSzTx/>
+              <a:buFontTx/>
+              <a:buNone/>
+              <a:tabLst/>
+              <a:defRPr/>
+            </a:pPr>
+            <a:r>
+              <a:rPr lang="en-US" dirty="0"/>
+              <a:t>Data Cleanup &amp; Exploration  * Describe the exploration and cleanup process  * Discuss insights you had while exploring the data that you didn't anticipate</a:t>
+            </a:r>
+            <a:br>
+              <a:rPr lang="en-US" dirty="0"/>
+            </a:br>
+            <a:r>
+              <a:rPr lang="en-US" dirty="0"/>
+              <a:t>  * Discuss any problems that arose after exploring the data, and how you resolved them  * Present and discuss interesting figures developed during exploration, ideally with the help of </a:t>
+            </a:r>
+            <a:r>
+              <a:rPr lang="en-US" dirty="0" err="1"/>
+              <a:t>Jupyter</a:t>
+            </a:r>
+            <a:r>
+              <a:rPr lang="en-US" dirty="0"/>
+              <a:t> Notebook</a:t>
+            </a:r>
+            <a:br>
+              <a:rPr lang="en-US" dirty="0"/>
+            </a:br>
+            <a:endParaRPr lang="en-US" dirty="0"/>
+          </a:p>
+          <a:p>
+            <a:endParaRPr lang="en-US" dirty="0"/>
+          </a:p>
+        </p:txBody>
+      </p:sp>
+      <p:sp>
+        <p:nvSpPr>
+          <p:cNvPr id="4" name="Slide Number Placeholder 3"/>
+          <p:cNvSpPr>
+            <a:spLocks noGrp="1"/>
+          </p:cNvSpPr>
+          <p:nvPr>
+            <p:ph type="sldNum" sz="quarter" idx="5"/>
+          </p:nvPr>
+        </p:nvSpPr>
+        <p:spPr/>
+        <p:txBody>
+          <a:bodyPr/>
+          <a:lstStyle/>
+          <a:p>
+            <a:fld id="{F2AA9531-316C-4165-8E90-F2F48CBAD168}" type="slidenum">
+              <a:rPr lang="en-US" altLang="en-US" smtClean="0"/>
+              <a:pPr/>
+              <a:t>4</a:t>
+            </a:fld>
+            <a:endParaRPr lang="en-US" altLang="en-US"/>
+          </a:p>
+        </p:txBody>
+      </p:sp>
+    </p:spTree>
+    <p:extLst>
+      <p:ext uri="{BB962C8B-B14F-4D97-AF65-F5344CB8AC3E}">
+        <p14:creationId xmlns:p14="http://schemas.microsoft.com/office/powerpoint/2010/main" val="814062007"/>
+      </p:ext>
+    </p:extLst>
+  </p:cSld>
+  <p:clrMapOvr>
+    <a:masterClrMapping/>
+  </p:clrMapOvr>
+</p:notes>
+</file>
+
+<file path=ppt/notesSlides/notesSlide4.xml><?xml version="1.0" encoding="utf-8"?>
+<p:notes xmlns:a="http://schemas.openxmlformats.org/drawingml/2006/main" xmlns:r="http://schemas.openxmlformats.org/officeDocument/2006/relationships" xmlns:p="http://schemas.openxmlformats.org/presentationml/2006/main">
+  <p:cSld>
+    <p:spTree>
+      <p:nvGrpSpPr>
+        <p:cNvPr id="1" name=""/>
+        <p:cNvGrpSpPr/>
+        <p:nvPr/>
+      </p:nvGrpSpPr>
+      <p:grpSpPr>
+        <a:xfrm>
+          <a:off x="0" y="0"/>
+          <a:ext cx="0" cy="0"/>
+          <a:chOff x="0" y="0"/>
+          <a:chExt cx="0" cy="0"/>
+        </a:xfrm>
+      </p:grpSpPr>
+      <p:sp>
+        <p:nvSpPr>
+          <p:cNvPr id="2" name="Slide Image Placeholder 1"/>
+          <p:cNvSpPr>
+            <a:spLocks noGrp="1" noRot="1" noChangeAspect="1"/>
+          </p:cNvSpPr>
+          <p:nvPr>
+            <p:ph type="sldImg"/>
+          </p:nvPr>
+        </p:nvSpPr>
+        <p:spPr/>
+      </p:sp>
+      <p:sp>
+        <p:nvSpPr>
+          <p:cNvPr id="3" name="Notes Placeholder 2"/>
+          <p:cNvSpPr>
+            <a:spLocks noGrp="1"/>
+          </p:cNvSpPr>
+          <p:nvPr>
+            <p:ph type="body" idx="1"/>
+          </p:nvPr>
+        </p:nvSpPr>
+        <p:spPr/>
+        <p:txBody>
+          <a:bodyPr/>
+          <a:lstStyle/>
+          <a:p>
+            <a:pPr marL="0" marR="0" lvl="0" indent="0" algn="l" defTabSz="914400" rtl="0" eaLnBrk="0" fontAlgn="base" latinLnBrk="0" hangingPunct="0">
+              <a:lnSpc>
+                <a:spcPct val="100000"/>
+              </a:lnSpc>
+              <a:spcBef>
+                <a:spcPct val="30000"/>
+              </a:spcBef>
+              <a:spcAft>
+                <a:spcPct val="0"/>
+              </a:spcAft>
+              <a:buClrTx/>
+              <a:buSzTx/>
+              <a:buFontTx/>
+              <a:buNone/>
+              <a:tabLst/>
+              <a:defRPr/>
+            </a:pPr>
+            <a:r>
+              <a:rPr lang="en-US" dirty="0"/>
+              <a:t>Weather Data – Discuss the way the weather was cleaned up and applied…..</a:t>
+            </a:r>
+          </a:p>
+          <a:p>
+            <a:endParaRPr lang="en-US" dirty="0"/>
+          </a:p>
+        </p:txBody>
+      </p:sp>
+      <p:sp>
+        <p:nvSpPr>
+          <p:cNvPr id="4" name="Slide Number Placeholder 3"/>
+          <p:cNvSpPr>
+            <a:spLocks noGrp="1"/>
+          </p:cNvSpPr>
+          <p:nvPr>
+            <p:ph type="sldNum" sz="quarter" idx="5"/>
+          </p:nvPr>
+        </p:nvSpPr>
+        <p:spPr/>
+        <p:txBody>
+          <a:bodyPr/>
+          <a:lstStyle/>
+          <a:p>
+            <a:fld id="{F2AA9531-316C-4165-8E90-F2F48CBAD168}" type="slidenum">
+              <a:rPr lang="en-US" altLang="en-US" smtClean="0"/>
+              <a:pPr/>
+              <a:t>5</a:t>
+            </a:fld>
+            <a:endParaRPr lang="en-US" altLang="en-US"/>
+          </a:p>
+        </p:txBody>
+      </p:sp>
+    </p:spTree>
+    <p:extLst>
+      <p:ext uri="{BB962C8B-B14F-4D97-AF65-F5344CB8AC3E}">
+        <p14:creationId xmlns:p14="http://schemas.microsoft.com/office/powerpoint/2010/main" val="1166454773"/>
+      </p:ext>
+    </p:extLst>
+  </p:cSld>
+  <p:clrMapOvr>
+    <a:masterClrMapping/>
+  </p:clrMapOvr>
+</p:notes>
+</file>
+
+<file path=ppt/notesSlides/notesSlide5.xml><?xml version="1.0" encoding="utf-8"?>
+<p:notes xmlns:a="http://schemas.openxmlformats.org/drawingml/2006/main" xmlns:r="http://schemas.openxmlformats.org/officeDocument/2006/relationships" xmlns:p="http://schemas.openxmlformats.org/presentationml/2006/main">
+  <p:cSld>
+    <p:spTree>
+      <p:nvGrpSpPr>
+        <p:cNvPr id="1" name=""/>
+        <p:cNvGrpSpPr/>
+        <p:nvPr/>
+      </p:nvGrpSpPr>
+      <p:grpSpPr>
+        <a:xfrm>
+          <a:off x="0" y="0"/>
+          <a:ext cx="0" cy="0"/>
+          <a:chOff x="0" y="0"/>
+          <a:chExt cx="0" cy="0"/>
+        </a:xfrm>
+      </p:grpSpPr>
+      <p:sp>
+        <p:nvSpPr>
+          <p:cNvPr id="2" name="Slide Image Placeholder 1"/>
+          <p:cNvSpPr>
+            <a:spLocks noGrp="1" noRot="1" noChangeAspect="1"/>
+          </p:cNvSpPr>
+          <p:nvPr>
+            <p:ph type="sldImg"/>
+          </p:nvPr>
+        </p:nvSpPr>
+        <p:spPr/>
+      </p:sp>
+      <p:sp>
+        <p:nvSpPr>
+          <p:cNvPr id="3" name="Notes Placeholder 2"/>
+          <p:cNvSpPr>
+            <a:spLocks noGrp="1"/>
+          </p:cNvSpPr>
+          <p:nvPr>
+            <p:ph type="body" idx="1"/>
+          </p:nvPr>
+        </p:nvSpPr>
+        <p:spPr/>
+        <p:txBody>
+          <a:bodyPr/>
+          <a:lstStyle/>
+          <a:p>
+            <a:endParaRPr lang="en-US" dirty="0"/>
+          </a:p>
+        </p:txBody>
+      </p:sp>
+      <p:sp>
+        <p:nvSpPr>
+          <p:cNvPr id="4" name="Slide Number Placeholder 3"/>
+          <p:cNvSpPr>
+            <a:spLocks noGrp="1"/>
+          </p:cNvSpPr>
+          <p:nvPr>
+            <p:ph type="sldNum" sz="quarter" idx="5"/>
+          </p:nvPr>
+        </p:nvSpPr>
+        <p:spPr/>
+        <p:txBody>
+          <a:bodyPr/>
+          <a:lstStyle/>
+          <a:p>
+            <a:fld id="{F2AA9531-316C-4165-8E90-F2F48CBAD168}" type="slidenum">
+              <a:rPr lang="en-US" altLang="en-US" smtClean="0"/>
+              <a:pPr/>
+              <a:t>6</a:t>
+            </a:fld>
+            <a:endParaRPr lang="en-US" altLang="en-US"/>
+          </a:p>
+        </p:txBody>
+      </p:sp>
+    </p:spTree>
+    <p:extLst>
+      <p:ext uri="{BB962C8B-B14F-4D97-AF65-F5344CB8AC3E}">
+        <p14:creationId xmlns:p14="http://schemas.microsoft.com/office/powerpoint/2010/main" val="3290494889"/>
+      </p:ext>
+    </p:extLst>
+  </p:cSld>
+  <p:clrMapOvr>
+    <a:masterClrMapping/>
+  </p:clrMapOvr>
+</p:notes>
+</file>
+
 <file path=ppt/slideLayouts/slideLayout1.xml><?xml version="1.0" encoding="utf-8"?>
 <p:sldLayout xmlns:a="http://schemas.openxmlformats.org/drawingml/2006/main" xmlns:r="http://schemas.openxmlformats.org/officeDocument/2006/relationships" xmlns:p="http://schemas.openxmlformats.org/presentationml/2006/main" type="title" preserve="1">
   <p:cSld name="Title Slide">
@@ -714,7 +1301,7 @@
               <a:pPr>
                 <a:defRPr/>
               </a:pPr>
-              <a:t>7/4/2020</a:t>
+              <a:t>7/6/2020</a:t>
             </a:fld>
             <a:endParaRPr lang="en-US"/>
           </a:p>
@@ -929,7 +1516,7 @@
               <a:pPr>
                 <a:defRPr/>
               </a:pPr>
-              <a:t>7/4/2020</a:t>
+              <a:t>7/6/2020</a:t>
             </a:fld>
             <a:endParaRPr lang="en-US"/>
           </a:p>
@@ -1129,7 +1716,7 @@
               <a:pPr>
                 <a:defRPr/>
               </a:pPr>
-              <a:t>7/4/2020</a:t>
+              <a:t>7/6/2020</a:t>
             </a:fld>
             <a:endParaRPr lang="en-US"/>
           </a:p>
@@ -1205,6 +1792,21 @@
 <file path=ppt/slideLayouts/slideLayout2.xml><?xml version="1.0" encoding="utf-8"?>
 <p:sldLayout xmlns:a="http://schemas.openxmlformats.org/drawingml/2006/main" xmlns:r="http://schemas.openxmlformats.org/officeDocument/2006/relationships" xmlns:p="http://schemas.openxmlformats.org/presentationml/2006/main" type="obj" preserve="1">
   <p:cSld name="Title and Content">
+    <p:bg>
+      <p:bgPr>
+        <a:blipFill dpi="0" rotWithShape="0">
+          <a:blip r:embed="rId2">
+            <a:alphaModFix amt="94000"/>
+            <a:lum/>
+          </a:blip>
+          <a:srcRect/>
+          <a:stretch>
+            <a:fillRect/>
+          </a:stretch>
+        </a:blipFill>
+        <a:effectLst/>
+      </p:bgPr>
+    </p:bg>
     <p:spTree>
       <p:nvGrpSpPr>
         <p:cNvPr id="1" name=""/>
@@ -1338,7 +1940,7 @@
               <a:pPr>
                 <a:defRPr/>
               </a:pPr>
-              <a:t>7/4/2020</a:t>
+              <a:t>7/6/2020</a:t>
             </a:fld>
             <a:endParaRPr lang="en-US"/>
           </a:p>
@@ -1605,7 +2207,7 @@
               <a:pPr>
                 <a:defRPr/>
               </a:pPr>
-              <a:t>7/4/2020</a:t>
+              <a:t>7/6/2020</a:t>
             </a:fld>
             <a:endParaRPr lang="en-US"/>
           </a:p>
@@ -1912,7 +2514,7 @@
               <a:pPr>
                 <a:defRPr/>
               </a:pPr>
-              <a:t>7/4/2020</a:t>
+              <a:t>7/6/2020</a:t>
             </a:fld>
             <a:endParaRPr lang="en-US"/>
           </a:p>
@@ -2353,7 +2955,7 @@
               <a:pPr>
                 <a:defRPr/>
               </a:pPr>
-              <a:t>7/4/2020</a:t>
+              <a:t>7/6/2020</a:t>
             </a:fld>
             <a:endParaRPr lang="en-US"/>
           </a:p>
@@ -2492,7 +3094,7 @@
               <a:pPr>
                 <a:defRPr/>
               </a:pPr>
-              <a:t>7/4/2020</a:t>
+              <a:t>7/6/2020</a:t>
             </a:fld>
             <a:endParaRPr lang="en-US"/>
           </a:p>
@@ -2609,7 +3211,7 @@
               <a:pPr>
                 <a:defRPr/>
               </a:pPr>
-              <a:t>7/4/2020</a:t>
+              <a:t>7/6/2020</a:t>
             </a:fld>
             <a:endParaRPr lang="en-US"/>
           </a:p>
@@ -2906,7 +3508,7 @@
               <a:pPr>
                 <a:defRPr/>
               </a:pPr>
-              <a:t>7/4/2020</a:t>
+              <a:t>7/6/2020</a:t>
             </a:fld>
             <a:endParaRPr lang="en-US"/>
           </a:p>
@@ -3186,7 +3788,7 @@
               <a:pPr>
                 <a:defRPr/>
               </a:pPr>
-              <a:t>7/4/2020</a:t>
+              <a:t>7/6/2020</a:t>
             </a:fld>
             <a:endParaRPr lang="en-US"/>
           </a:p>
@@ -3478,7 +4080,7 @@
               <a:pPr>
                 <a:defRPr/>
               </a:pPr>
-              <a:t>7/4/2020</a:t>
+              <a:t>7/6/2020</a:t>
             </a:fld>
             <a:endParaRPr lang="en-US"/>
           </a:p>
@@ -4000,22 +4602,435 @@
         </p:nvSpPr>
         <p:spPr>
           <a:xfrm>
-            <a:off x="1371600" y="5270500"/>
-            <a:ext cx="6400800" cy="612775"/>
+            <a:off x="342900" y="533400"/>
+            <a:ext cx="8458200" cy="1539875"/>
           </a:xfrm>
+          <a:solidFill>
+            <a:schemeClr val="accent1">
+              <a:alpha val="44000"/>
+            </a:schemeClr>
+          </a:solidFill>
         </p:spPr>
         <p:txBody>
           <a:bodyPr/>
           <a:lstStyle/>
           <a:p>
             <a:r>
-              <a:rPr lang="en-US" altLang="en-US" dirty="0"/>
-              <a:t>Does Atlanta Traffic Make us Crazy when it rains!?</a:t>
+              <a:rPr lang="en-US" altLang="en-US" dirty="0">
+                <a:solidFill>
+                  <a:srgbClr val="FFFF00"/>
+                </a:solidFill>
+              </a:rPr>
+              <a:t>Does the Weather in Atlanta make us Crazy in Traffic!?</a:t>
+            </a:r>
+          </a:p>
+        </p:txBody>
+      </p:sp>
+      <p:sp>
+        <p:nvSpPr>
+          <p:cNvPr id="2" name="TextBox 1">
+            <a:extLst>
+              <a:ext uri="{FF2B5EF4-FFF2-40B4-BE49-F238E27FC236}">
+                <a16:creationId xmlns:a16="http://schemas.microsoft.com/office/drawing/2014/main" id="{61851493-7296-4FE3-A35E-F0C0AC1BBBE0}"/>
+              </a:ext>
+            </a:extLst>
+          </p:cNvPr>
+          <p:cNvSpPr txBox="1"/>
+          <p:nvPr/>
+        </p:nvSpPr>
+        <p:spPr>
+          <a:xfrm>
+            <a:off x="1371600" y="5029200"/>
+            <a:ext cx="5867400" cy="1569660"/>
+          </a:xfrm>
+          <a:prstGeom prst="rect">
+            <a:avLst/>
+          </a:prstGeom>
+          <a:noFill/>
+        </p:spPr>
+        <p:txBody>
+          <a:bodyPr wrap="square" rtlCol="0">
+            <a:spAutoFit/>
+          </a:bodyPr>
+          <a:lstStyle/>
+          <a:p>
+            <a:pPr algn="ctr"/>
+            <a:r>
+              <a:rPr lang="en-US" sz="2400" dirty="0">
+                <a:solidFill>
+                  <a:srgbClr val="B9D1DF"/>
+                </a:solidFill>
+                <a:latin typeface="Sans Condensed" pitchFamily="34" charset="0"/>
+                <a:ea typeface="+mj-ea"/>
+                <a:cs typeface="+mj-cs"/>
+              </a:rPr>
+              <a:t>Amber </a:t>
+            </a:r>
+            <a:r>
+              <a:rPr lang="en-US" sz="2400" dirty="0" err="1">
+                <a:solidFill>
+                  <a:srgbClr val="B9D1DF"/>
+                </a:solidFill>
+                <a:latin typeface="Sans Condensed" pitchFamily="34" charset="0"/>
+                <a:ea typeface="+mj-ea"/>
+                <a:cs typeface="+mj-cs"/>
+              </a:rPr>
+              <a:t>Pizzo</a:t>
+            </a:r>
+            <a:endParaRPr lang="en-US" sz="2400" dirty="0">
+              <a:solidFill>
+                <a:srgbClr val="B9D1DF"/>
+              </a:solidFill>
+              <a:latin typeface="Sans Condensed" pitchFamily="34" charset="0"/>
+              <a:ea typeface="+mj-ea"/>
+              <a:cs typeface="+mj-cs"/>
+            </a:endParaRPr>
+          </a:p>
+          <a:p>
+            <a:pPr algn="ctr"/>
+            <a:r>
+              <a:rPr lang="en-US" sz="2400" dirty="0">
+                <a:solidFill>
+                  <a:srgbClr val="B9D1DF"/>
+                </a:solidFill>
+                <a:latin typeface="Sans Condensed" pitchFamily="34" charset="0"/>
+                <a:ea typeface="+mj-ea"/>
+                <a:cs typeface="+mj-cs"/>
+              </a:rPr>
+              <a:t>Alex </a:t>
+            </a:r>
+            <a:r>
+              <a:rPr lang="en-US" sz="2400" dirty="0" err="1">
+                <a:solidFill>
+                  <a:srgbClr val="B9D1DF"/>
+                </a:solidFill>
+                <a:latin typeface="Sans Condensed" pitchFamily="34" charset="0"/>
+                <a:ea typeface="+mj-ea"/>
+                <a:cs typeface="+mj-cs"/>
+              </a:rPr>
+              <a:t>Caughman</a:t>
+            </a:r>
+            <a:endParaRPr lang="en-US" sz="2400" dirty="0">
+              <a:solidFill>
+                <a:srgbClr val="B9D1DF"/>
+              </a:solidFill>
+              <a:latin typeface="Sans Condensed" pitchFamily="34" charset="0"/>
+              <a:ea typeface="+mj-ea"/>
+              <a:cs typeface="+mj-cs"/>
+            </a:endParaRPr>
+          </a:p>
+          <a:p>
+            <a:pPr algn="ctr"/>
+            <a:r>
+              <a:rPr lang="en-US" sz="2400" dirty="0">
+                <a:solidFill>
+                  <a:srgbClr val="B9D1DF"/>
+                </a:solidFill>
+                <a:latin typeface="Sans Condensed" pitchFamily="34" charset="0"/>
+                <a:ea typeface="+mj-ea"/>
+                <a:cs typeface="+mj-cs"/>
+              </a:rPr>
+              <a:t>John Shows</a:t>
+            </a:r>
+          </a:p>
+          <a:p>
+            <a:pPr algn="ctr"/>
+            <a:r>
+              <a:rPr lang="en-US" sz="2400" dirty="0">
+                <a:solidFill>
+                  <a:srgbClr val="B9D1DF"/>
+                </a:solidFill>
+                <a:latin typeface="Sans Condensed" pitchFamily="34" charset="0"/>
+                <a:ea typeface="+mj-ea"/>
+                <a:cs typeface="+mj-cs"/>
+              </a:rPr>
+              <a:t>Steven White</a:t>
             </a:r>
           </a:p>
         </p:txBody>
       </p:sp>
     </p:spTree>
+  </p:cSld>
+  <p:clrMapOvr>
+    <a:masterClrMapping/>
+  </p:clrMapOvr>
+  <p:transition>
+    <p:fade/>
+  </p:transition>
+  <p:timing>
+    <p:tnLst>
+      <p:par>
+        <p:cTn id="1" dur="indefinite" restart="never" nodeType="tmRoot">
+          <p:childTnLst>
+            <p:seq concurrent="1" nextAc="seek">
+              <p:cTn id="2" dur="indefinite" nodeType="mainSeq">
+                <p:childTnLst>
+                  <p:par>
+                    <p:cTn id="3" fill="hold" nodeType="clickPar">
+                      <p:stCondLst>
+                        <p:cond delay="indefinite"/>
+                        <p:cond evt="onBegin" delay="0">
+                          <p:tn val="2"/>
+                        </p:cond>
+                      </p:stCondLst>
+                      <p:childTnLst>
+                        <p:par>
+                          <p:cTn id="4" fill="hold" nodeType="withGroup">
+                            <p:stCondLst>
+                              <p:cond delay="0"/>
+                            </p:stCondLst>
+                            <p:childTnLst>
+                              <p:par>
+                                <p:cTn id="5" presetID="12" presetClass="entr" presetSubtype="8" fill="hold" grpId="0" nodeType="afterEffect">
+                                  <p:stCondLst>
+                                    <p:cond delay="0"/>
+                                  </p:stCondLst>
+                                  <p:childTnLst>
+                                    <p:set>
+                                      <p:cBhvr>
+                                        <p:cTn id="6" dur="1" fill="hold">
+                                          <p:stCondLst>
+                                            <p:cond delay="0"/>
+                                          </p:stCondLst>
+                                        </p:cTn>
+                                        <p:tgtEl>
+                                          <p:spTgt spid="2053"/>
+                                        </p:tgtEl>
+                                        <p:attrNameLst>
+                                          <p:attrName>style.visibility</p:attrName>
+                                        </p:attrNameLst>
+                                      </p:cBhvr>
+                                      <p:to>
+                                        <p:strVal val="visible"/>
+                                      </p:to>
+                                    </p:set>
+                                    <p:animEffect transition="in" filter="slide(fromLeft)">
+                                      <p:cBhvr>
+                                        <p:cTn id="7" dur="500"/>
+                                        <p:tgtEl>
+                                          <p:spTgt spid="2053"/>
+                                        </p:tgtEl>
+                                      </p:cBhvr>
+                                    </p:animEffect>
+                                  </p:childTnLst>
+                                </p:cTn>
+                              </p:par>
+                            </p:childTnLst>
+                          </p:cTn>
+                        </p:par>
+                      </p:childTnLst>
+                    </p:cTn>
+                  </p:par>
+                </p:childTnLst>
+              </p:cTn>
+              <p:prevCondLst>
+                <p:cond evt="onPrev" delay="0">
+                  <p:tgtEl>
+                    <p:sldTgt/>
+                  </p:tgtEl>
+                </p:cond>
+              </p:prevCondLst>
+              <p:nextCondLst>
+                <p:cond evt="onNext" delay="0">
+                  <p:tgtEl>
+                    <p:sldTgt/>
+                  </p:tgtEl>
+                </p:cond>
+              </p:nextCondLst>
+            </p:seq>
+          </p:childTnLst>
+        </p:cTn>
+      </p:par>
+    </p:tnLst>
+    <p:bldLst>
+      <p:bldP spid="2053" grpId="0" autoUpdateAnimBg="0"/>
+    </p:bldLst>
+  </p:timing>
+</p:sld>
+</file>
+
+<file path=ppt/slides/slide10.xml><?xml version="1.0" encoding="utf-8"?>
+<p:sld xmlns:a="http://schemas.openxmlformats.org/drawingml/2006/main" xmlns:r="http://schemas.openxmlformats.org/officeDocument/2006/relationships" xmlns:p="http://schemas.openxmlformats.org/presentationml/2006/main" showMasterPhAnim="0">
+  <p:cSld>
+    <p:spTree>
+      <p:nvGrpSpPr>
+        <p:cNvPr id="1" name=""/>
+        <p:cNvGrpSpPr/>
+        <p:nvPr/>
+      </p:nvGrpSpPr>
+      <p:grpSpPr>
+        <a:xfrm>
+          <a:off x="0" y="0"/>
+          <a:ext cx="0" cy="0"/>
+          <a:chOff x="0" y="0"/>
+          <a:chExt cx="0" cy="0"/>
+        </a:xfrm>
+      </p:grpSpPr>
+      <p:sp>
+        <p:nvSpPr>
+          <p:cNvPr id="2053" name="Rectangle 5"/>
+          <p:cNvSpPr>
+            <a:spLocks noGrp="1"/>
+          </p:cNvSpPr>
+          <p:nvPr>
+            <p:ph type="ctrTitle"/>
+          </p:nvPr>
+        </p:nvSpPr>
+        <p:spPr>
+          <a:xfrm>
+            <a:off x="228600" y="457200"/>
+            <a:ext cx="8458200" cy="1539875"/>
+          </a:xfrm>
+          <a:solidFill>
+            <a:schemeClr val="accent1">
+              <a:alpha val="44000"/>
+            </a:schemeClr>
+          </a:solidFill>
+        </p:spPr>
+        <p:txBody>
+          <a:bodyPr/>
+          <a:lstStyle/>
+          <a:p>
+            <a:r>
+              <a:rPr lang="en-US" altLang="en-US" dirty="0">
+                <a:solidFill>
+                  <a:srgbClr val="FFFF00"/>
+                </a:solidFill>
+              </a:rPr>
+              <a:t>QUESTIONS?</a:t>
+            </a:r>
+          </a:p>
+        </p:txBody>
+      </p:sp>
+      <p:sp>
+        <p:nvSpPr>
+          <p:cNvPr id="2" name="TextBox 1">
+            <a:extLst>
+              <a:ext uri="{FF2B5EF4-FFF2-40B4-BE49-F238E27FC236}">
+                <a16:creationId xmlns:a16="http://schemas.microsoft.com/office/drawing/2014/main" id="{61851493-7296-4FE3-A35E-F0C0AC1BBBE0}"/>
+              </a:ext>
+            </a:extLst>
+          </p:cNvPr>
+          <p:cNvSpPr txBox="1"/>
+          <p:nvPr/>
+        </p:nvSpPr>
+        <p:spPr>
+          <a:xfrm>
+            <a:off x="1371600" y="5105400"/>
+            <a:ext cx="5867400" cy="1569660"/>
+          </a:xfrm>
+          <a:prstGeom prst="rect">
+            <a:avLst/>
+          </a:prstGeom>
+          <a:noFill/>
+        </p:spPr>
+        <p:txBody>
+          <a:bodyPr wrap="square" rtlCol="0">
+            <a:spAutoFit/>
+          </a:bodyPr>
+          <a:lstStyle/>
+          <a:p>
+            <a:pPr algn="ctr"/>
+            <a:r>
+              <a:rPr lang="en-US" sz="2400" dirty="0">
+                <a:solidFill>
+                  <a:srgbClr val="B9D1DF"/>
+                </a:solidFill>
+                <a:latin typeface="Sans Condensed" pitchFamily="34" charset="0"/>
+                <a:ea typeface="+mj-ea"/>
+                <a:cs typeface="+mj-cs"/>
+              </a:rPr>
+              <a:t>Amber </a:t>
+            </a:r>
+            <a:r>
+              <a:rPr lang="en-US" sz="2400" dirty="0" err="1">
+                <a:solidFill>
+                  <a:srgbClr val="B9D1DF"/>
+                </a:solidFill>
+                <a:latin typeface="Sans Condensed" pitchFamily="34" charset="0"/>
+                <a:ea typeface="+mj-ea"/>
+                <a:cs typeface="+mj-cs"/>
+              </a:rPr>
+              <a:t>Pizzo</a:t>
+            </a:r>
+            <a:endParaRPr lang="en-US" sz="2400" dirty="0">
+              <a:solidFill>
+                <a:srgbClr val="B9D1DF"/>
+              </a:solidFill>
+              <a:latin typeface="Sans Condensed" pitchFamily="34" charset="0"/>
+              <a:ea typeface="+mj-ea"/>
+              <a:cs typeface="+mj-cs"/>
+            </a:endParaRPr>
+          </a:p>
+          <a:p>
+            <a:pPr algn="ctr"/>
+            <a:r>
+              <a:rPr lang="en-US" sz="2400" dirty="0">
+                <a:solidFill>
+                  <a:srgbClr val="B9D1DF"/>
+                </a:solidFill>
+                <a:latin typeface="Sans Condensed" pitchFamily="34" charset="0"/>
+                <a:ea typeface="+mj-ea"/>
+                <a:cs typeface="+mj-cs"/>
+              </a:rPr>
+              <a:t>Alex </a:t>
+            </a:r>
+            <a:r>
+              <a:rPr lang="en-US" sz="2400" dirty="0" err="1">
+                <a:solidFill>
+                  <a:srgbClr val="B9D1DF"/>
+                </a:solidFill>
+                <a:latin typeface="Sans Condensed" pitchFamily="34" charset="0"/>
+                <a:ea typeface="+mj-ea"/>
+                <a:cs typeface="+mj-cs"/>
+              </a:rPr>
+              <a:t>Caughman</a:t>
+            </a:r>
+            <a:endParaRPr lang="en-US" sz="2400" dirty="0">
+              <a:solidFill>
+                <a:srgbClr val="B9D1DF"/>
+              </a:solidFill>
+              <a:latin typeface="Sans Condensed" pitchFamily="34" charset="0"/>
+              <a:ea typeface="+mj-ea"/>
+              <a:cs typeface="+mj-cs"/>
+            </a:endParaRPr>
+          </a:p>
+          <a:p>
+            <a:pPr algn="ctr"/>
+            <a:r>
+              <a:rPr lang="en-US" sz="2400" dirty="0">
+                <a:solidFill>
+                  <a:srgbClr val="B9D1DF"/>
+                </a:solidFill>
+                <a:latin typeface="Sans Condensed" pitchFamily="34" charset="0"/>
+                <a:ea typeface="+mj-ea"/>
+                <a:cs typeface="+mj-cs"/>
+              </a:rPr>
+              <a:t>John Shows</a:t>
+            </a:r>
+          </a:p>
+          <a:p>
+            <a:pPr algn="ctr"/>
+            <a:r>
+              <a:rPr lang="en-US" sz="2400" dirty="0">
+                <a:solidFill>
+                  <a:srgbClr val="B9D1DF"/>
+                </a:solidFill>
+                <a:latin typeface="Sans Condensed" pitchFamily="34" charset="0"/>
+                <a:ea typeface="+mj-ea"/>
+                <a:cs typeface="+mj-cs"/>
+              </a:rPr>
+              <a:t>Steven White</a:t>
+            </a:r>
+          </a:p>
+        </p:txBody>
+      </p:sp>
+    </p:spTree>
+    <p:extLst>
+      <p:ext uri="{BB962C8B-B14F-4D97-AF65-F5344CB8AC3E}">
+        <p14:creationId xmlns:p14="http://schemas.microsoft.com/office/powerpoint/2010/main" val="2173870734"/>
+      </p:ext>
+    </p:extLst>
   </p:cSld>
   <p:clrMapOvr>
     <a:masterClrMapping/>
@@ -4149,53 +5164,164 @@
           <a:p>
             <a:pPr eaLnBrk="1" hangingPunct="1"/>
             <a:r>
-              <a:rPr lang="en-US" altLang="en-US"/>
-              <a:t>Slide Master</a:t>
-            </a:r>
-          </a:p>
-        </p:txBody>
-      </p:sp>
-      <p:sp>
-        <p:nvSpPr>
-          <p:cNvPr id="4099" name="Content Placeholder 2"/>
-          <p:cNvSpPr>
-            <a:spLocks noGrp="1"/>
-          </p:cNvSpPr>
-          <p:nvPr>
-            <p:ph type="body" idx="1"/>
-          </p:nvPr>
-        </p:nvSpPr>
-        <p:spPr/>
-        <p:txBody>
-          <a:bodyPr/>
+              <a:rPr lang="en-US" altLang="en-US" dirty="0">
+                <a:solidFill>
+                  <a:srgbClr val="FFFF00"/>
+                </a:solidFill>
+              </a:rPr>
+              <a:t>Does weather cause more traffic accidents?</a:t>
+            </a:r>
+          </a:p>
+        </p:txBody>
+      </p:sp>
+      <p:pic>
+        <p:nvPicPr>
+          <p:cNvPr id="1026" name="Picture 2">
+            <a:extLst>
+              <a:ext uri="{FF2B5EF4-FFF2-40B4-BE49-F238E27FC236}">
+                <a16:creationId xmlns:a16="http://schemas.microsoft.com/office/drawing/2014/main" id="{4B155802-53E2-4B1E-A7EE-E9422FF9D703}"/>
+              </a:ext>
+            </a:extLst>
+          </p:cNvPr>
+          <p:cNvPicPr>
+            <a:picLocks noGrp="1" noChangeAspect="1" noChangeArrowheads="1"/>
+          </p:cNvPicPr>
+          <p:nvPr>
+            <p:ph idx="1"/>
+          </p:nvPr>
+        </p:nvPicPr>
+        <p:blipFill>
+          <a:blip r:embed="rId3">
+            <a:extLst>
+              <a:ext uri="{28A0092B-C50C-407E-A947-70E740481C1C}">
+                <a14:useLocalDpi xmlns:a14="http://schemas.microsoft.com/office/drawing/2010/main" val="0"/>
+              </a:ext>
+            </a:extLst>
+          </a:blip>
+          <a:srcRect/>
+          <a:stretch>
+            <a:fillRect/>
+          </a:stretch>
+        </p:blipFill>
+        <p:spPr bwMode="auto">
+          <a:xfrm>
+            <a:off x="206643" y="2057400"/>
+            <a:ext cx="8458201" cy="3980503"/>
+          </a:xfrm>
+          <a:prstGeom prst="rect">
+            <a:avLst/>
+          </a:prstGeom>
+          <a:noFill/>
+          <a:extLst>
+            <a:ext uri="{909E8E84-426E-40DD-AFC4-6F175D3DCCD1}">
+              <a14:hiddenFill xmlns:a14="http://schemas.microsoft.com/office/drawing/2010/main">
+                <a:solidFill>
+                  <a:srgbClr val="FFFFFF"/>
+                </a:solidFill>
+              </a14:hiddenFill>
+            </a:ext>
+          </a:extLst>
+        </p:spPr>
+      </p:pic>
+      <p:sp>
+        <p:nvSpPr>
+          <p:cNvPr id="3" name="TextBox 2">
+            <a:extLst>
+              <a:ext uri="{FF2B5EF4-FFF2-40B4-BE49-F238E27FC236}">
+                <a16:creationId xmlns:a16="http://schemas.microsoft.com/office/drawing/2014/main" id="{F6FC53A7-B6A7-4B78-837A-54CF236E75AB}"/>
+              </a:ext>
+            </a:extLst>
+          </p:cNvPr>
+          <p:cNvSpPr txBox="1"/>
+          <p:nvPr/>
+        </p:nvSpPr>
+        <p:spPr>
+          <a:xfrm>
+            <a:off x="76200" y="1267361"/>
+            <a:ext cx="9067800" cy="1231106"/>
+          </a:xfrm>
+          <a:prstGeom prst="rect">
+            <a:avLst/>
+          </a:prstGeom>
+          <a:noFill/>
+        </p:spPr>
+        <p:txBody>
+          <a:bodyPr wrap="square" rtlCol="0">
+            <a:spAutoFit/>
+          </a:bodyPr>
           <a:lstStyle/>
           <a:p>
-            <a:pPr eaLnBrk="1" hangingPunct="1"/>
-            <a:r>
-              <a:rPr lang="en-US" altLang="en-US"/>
-              <a:t>Enter Your Text here.</a:t>
-            </a:r>
-          </a:p>
-          <a:p>
-            <a:pPr eaLnBrk="1" hangingPunct="1"/>
-            <a:endParaRPr lang="en-US" altLang="en-US"/>
-          </a:p>
-          <a:p>
-            <a:pPr eaLnBrk="1" hangingPunct="1"/>
-            <a:r>
-              <a:rPr lang="en-US" altLang="en-US"/>
-              <a:t>Lorem ipsum dolor sit amet, consectetur adipiscing elit. Sin laboramus, quis est, qui alienae modum statuat industriae? Atque haec ita iustitiae propria sunt, ut sint virtutum reliquarum communia. Illa videamus, quae a te de amicitia dicta sunt.</a:t>
-            </a:r>
-          </a:p>
-          <a:p>
-            <a:pPr eaLnBrk="1" hangingPunct="1"/>
-            <a:endParaRPr lang="en-US" altLang="en-US"/>
-          </a:p>
-          <a:p>
-            <a:pPr eaLnBrk="1" hangingPunct="1"/>
-            <a:r>
-              <a:rPr lang="en-US" altLang="en-US"/>
-              <a:t>Quia nec honesto quic quam honestius nec turpi turpius. Obsecro, inquit, Torquate, haec dicit Epicurus? Miserum hominem! Si dolor summum malum est, dici aliter non potest. Duo Reges: constructio interrete. Non est ista, inquam, Piso, magna dissensio.</a:t>
+            <a:pPr algn="ctr"/>
+            <a:r>
+              <a:rPr lang="en-US" dirty="0">
+                <a:solidFill>
+                  <a:srgbClr val="FFFF00"/>
+                </a:solidFill>
+              </a:rPr>
+              <a:t>Using  data analyzed in </a:t>
+            </a:r>
+            <a:r>
+              <a:rPr lang="en-US" dirty="0" err="1">
+                <a:solidFill>
+                  <a:srgbClr val="FFFF00"/>
+                </a:solidFill>
+              </a:rPr>
+              <a:t>Jupyter</a:t>
+            </a:r>
+            <a:r>
+              <a:rPr lang="en-US" dirty="0">
+                <a:solidFill>
+                  <a:srgbClr val="FFFF00"/>
+                </a:solidFill>
+              </a:rPr>
+              <a:t> Notebook; we found that during the two year period (2018-2019) the 10  zip codes in Atlanta with the highest accident counts experience more accidents on average when it rains.  </a:t>
+            </a:r>
+          </a:p>
+          <a:p>
+            <a:pPr algn="ctr"/>
+            <a:endParaRPr lang="en-US" sz="2000" dirty="0">
+              <a:solidFill>
+                <a:srgbClr val="FFFF00"/>
+              </a:solidFill>
+            </a:endParaRPr>
+          </a:p>
+        </p:txBody>
+      </p:sp>
+      <p:sp>
+        <p:nvSpPr>
+          <p:cNvPr id="4" name="Rectangle 3">
+            <a:extLst>
+              <a:ext uri="{FF2B5EF4-FFF2-40B4-BE49-F238E27FC236}">
+                <a16:creationId xmlns:a16="http://schemas.microsoft.com/office/drawing/2014/main" id="{599C8DD5-0129-44F3-AD13-B5EA545E0660}"/>
+              </a:ext>
+            </a:extLst>
+          </p:cNvPr>
+          <p:cNvSpPr/>
+          <p:nvPr/>
+        </p:nvSpPr>
+        <p:spPr>
+          <a:xfrm>
+            <a:off x="206643" y="6037903"/>
+            <a:ext cx="8458201" cy="646331"/>
+          </a:xfrm>
+          <a:prstGeom prst="rect">
+            <a:avLst/>
+          </a:prstGeom>
+        </p:spPr>
+        <p:txBody>
+          <a:bodyPr wrap="square">
+            <a:spAutoFit/>
+          </a:bodyPr>
+          <a:lstStyle/>
+          <a:p>
+            <a:pPr algn="ctr"/>
+            <a:r>
+              <a:rPr lang="en-US" dirty="0">
+                <a:solidFill>
+                  <a:srgbClr val="FFFF00"/>
+                </a:solidFill>
+              </a:rPr>
+              <a:t>Let’s examine further and determine the confidence we have of this finding and explore other weather conditions that may have similar effects during the same two year period.</a:t>
             </a:r>
           </a:p>
         </p:txBody>
@@ -4208,130 +5334,1322 @@
   <p:transition>
     <p:fade/>
   </p:transition>
-  <p:timing>
-    <p:tnLst>
-      <p:par>
-        <p:cTn id="1" dur="indefinite" restart="never" nodeType="tmRoot">
-          <p:childTnLst>
-            <p:seq concurrent="1" nextAc="seek">
-              <p:cTn id="2" dur="indefinite" nodeType="mainSeq">
-                <p:childTnLst>
-                  <p:par>
-                    <p:cTn id="3" fill="hold" nodeType="clickPar">
-                      <p:stCondLst>
-                        <p:cond delay="indefinite"/>
-                        <p:cond evt="onBegin" delay="0">
-                          <p:tn val="2"/>
-                        </p:cond>
-                      </p:stCondLst>
-                      <p:childTnLst>
-                        <p:par>
-                          <p:cTn id="4" fill="hold" nodeType="withGroup">
-                            <p:stCondLst>
-                              <p:cond delay="0"/>
-                            </p:stCondLst>
-                            <p:childTnLst>
-                              <p:par>
-                                <p:cTn id="5" presetID="12" presetClass="entr" presetSubtype="2" fill="hold" grpId="0" nodeType="afterEffect">
-                                  <p:stCondLst>
-                                    <p:cond delay="0"/>
-                                  </p:stCondLst>
-                                  <p:childTnLst>
-                                    <p:set>
-                                      <p:cBhvr>
-                                        <p:cTn id="6" dur="1" fill="hold">
-                                          <p:stCondLst>
-                                            <p:cond delay="0"/>
-                                          </p:stCondLst>
-                                        </p:cTn>
-                                        <p:tgtEl>
-                                          <p:spTgt spid="4099">
-                                            <p:txEl>
-                                              <p:pRg st="0" end="0"/>
-                                            </p:txEl>
-                                          </p:spTgt>
-                                        </p:tgtEl>
-                                        <p:attrNameLst>
-                                          <p:attrName>style.visibility</p:attrName>
-                                        </p:attrNameLst>
-                                      </p:cBhvr>
-                                      <p:to>
-                                        <p:strVal val="visible"/>
-                                      </p:to>
-                                    </p:set>
-                                    <p:anim calcmode="lin" valueType="num">
-                                      <p:cBhvr additive="base">
-                                        <p:cTn id="7" dur="500"/>
-                                        <p:tgtEl>
-                                          <p:spTgt spid="4099">
-                                            <p:txEl>
-                                              <p:pRg st="0" end="0"/>
-                                            </p:txEl>
-                                          </p:spTgt>
-                                        </p:tgtEl>
-                                        <p:attrNameLst>
-                                          <p:attrName>ppt_x</p:attrName>
-                                        </p:attrNameLst>
-                                      </p:cBhvr>
-                                      <p:tavLst>
-                                        <p:tav tm="0">
-                                          <p:val>
-                                            <p:strVal val="#ppt_x+#ppt_w*1.125000"/>
-                                          </p:val>
-                                        </p:tav>
-                                        <p:tav tm="100000">
-                                          <p:val>
-                                            <p:strVal val="#ppt_x"/>
-                                          </p:val>
-                                        </p:tav>
-                                      </p:tavLst>
-                                    </p:anim>
-                                    <p:animEffect transition="in" filter="wipe(left)">
-                                      <p:cBhvr>
-                                        <p:cTn id="8" dur="500"/>
-                                        <p:tgtEl>
-                                          <p:spTgt spid="4099">
-                                            <p:txEl>
-                                              <p:pRg st="0" end="0"/>
-                                            </p:txEl>
-                                          </p:spTgt>
-                                        </p:tgtEl>
-                                      </p:cBhvr>
-                                    </p:animEffect>
-                                  </p:childTnLst>
-                                </p:cTn>
-                              </p:par>
-                            </p:childTnLst>
-                          </p:cTn>
-                        </p:par>
-                      </p:childTnLst>
-                    </p:cTn>
-                  </p:par>
-                </p:childTnLst>
-              </p:cTn>
-              <p:prevCondLst>
-                <p:cond evt="onPrev" delay="0">
-                  <p:tgtEl>
-                    <p:sldTgt/>
-                  </p:tgtEl>
-                </p:cond>
-              </p:prevCondLst>
-              <p:nextCondLst>
-                <p:cond evt="onNext" delay="0">
-                  <p:tgtEl>
-                    <p:sldTgt/>
-                  </p:tgtEl>
-                </p:cond>
-              </p:nextCondLst>
-            </p:seq>
-          </p:childTnLst>
-        </p:cTn>
-      </p:par>
-    </p:tnLst>
-    <p:bldLst>
-      <p:bldP spid="4099" grpId="0" build="p" autoUpdateAnimBg="0"/>
-    </p:bldLst>
-  </p:timing>
+</p:sld>
+</file>
+
+<file path=ppt/slides/slide3.xml><?xml version="1.0" encoding="utf-8"?>
+<p:sld xmlns:a="http://schemas.openxmlformats.org/drawingml/2006/main" xmlns:r="http://schemas.openxmlformats.org/officeDocument/2006/relationships" xmlns:p="http://schemas.openxmlformats.org/presentationml/2006/main" showMasterPhAnim="0">
+  <p:cSld>
+    <p:spTree>
+      <p:nvGrpSpPr>
+        <p:cNvPr id="1" name=""/>
+        <p:cNvGrpSpPr/>
+        <p:nvPr/>
+      </p:nvGrpSpPr>
+      <p:grpSpPr>
+        <a:xfrm>
+          <a:off x="0" y="0"/>
+          <a:ext cx="0" cy="0"/>
+          <a:chOff x="0" y="0"/>
+          <a:chExt cx="0" cy="0"/>
+        </a:xfrm>
+      </p:grpSpPr>
+      <p:sp>
+        <p:nvSpPr>
+          <p:cNvPr id="5122" name="Title 1"/>
+          <p:cNvSpPr>
+            <a:spLocks noGrp="1"/>
+          </p:cNvSpPr>
+          <p:nvPr>
+            <p:ph type="title"/>
+          </p:nvPr>
+        </p:nvSpPr>
+        <p:spPr/>
+        <p:txBody>
+          <a:bodyPr/>
+          <a:lstStyle/>
+          <a:p>
+            <a:pPr eaLnBrk="1" hangingPunct="1"/>
+            <a:r>
+              <a:rPr lang="en-US" altLang="en-US" dirty="0">
+                <a:solidFill>
+                  <a:srgbClr val="FFFF00"/>
+                </a:solidFill>
+              </a:rPr>
+              <a:t>Data Sources</a:t>
+            </a:r>
+          </a:p>
+        </p:txBody>
+      </p:sp>
+      <p:sp>
+        <p:nvSpPr>
+          <p:cNvPr id="4099" name="Content Placeholder 2"/>
+          <p:cNvSpPr>
+            <a:spLocks noGrp="1"/>
+          </p:cNvSpPr>
+          <p:nvPr>
+            <p:ph type="body" idx="1"/>
+          </p:nvPr>
+        </p:nvSpPr>
+        <p:spPr/>
+        <p:txBody>
+          <a:bodyPr/>
+          <a:lstStyle/>
+          <a:p>
+            <a:pPr eaLnBrk="1" hangingPunct="1"/>
+            <a:endParaRPr lang="en-US" altLang="en-US" dirty="0"/>
+          </a:p>
+          <a:p>
+            <a:pPr marL="0" indent="0" eaLnBrk="1" hangingPunct="1">
+              <a:buNone/>
+            </a:pPr>
+            <a:endParaRPr lang="en-US" altLang="en-US" dirty="0"/>
+          </a:p>
+        </p:txBody>
+      </p:sp>
+      <p:sp>
+        <p:nvSpPr>
+          <p:cNvPr id="2" name="TextBox 1">
+            <a:extLst>
+              <a:ext uri="{FF2B5EF4-FFF2-40B4-BE49-F238E27FC236}">
+                <a16:creationId xmlns:a16="http://schemas.microsoft.com/office/drawing/2014/main" id="{464139CD-594F-4D5C-A979-A0B66E3C6837}"/>
+              </a:ext>
+            </a:extLst>
+          </p:cNvPr>
+          <p:cNvSpPr txBox="1"/>
+          <p:nvPr/>
+        </p:nvSpPr>
+        <p:spPr>
+          <a:xfrm>
+            <a:off x="78154" y="1590675"/>
+            <a:ext cx="8875346" cy="3693319"/>
+          </a:xfrm>
+          <a:prstGeom prst="rect">
+            <a:avLst/>
+          </a:prstGeom>
+          <a:noFill/>
+        </p:spPr>
+        <p:txBody>
+          <a:bodyPr wrap="square" rtlCol="0">
+            <a:spAutoFit/>
+          </a:bodyPr>
+          <a:lstStyle/>
+          <a:p>
+            <a:r>
+              <a:rPr lang="en-US" dirty="0">
+                <a:solidFill>
+                  <a:schemeClr val="bg1"/>
+                </a:solidFill>
+              </a:rPr>
+              <a:t>Traffic Data:  Kaggle - US Accidents (3.5 million records) A Countrywide Traffic Accident Dataset (2016 - 2020)</a:t>
+            </a:r>
+          </a:p>
+          <a:p>
+            <a:r>
+              <a:rPr lang="en-US" sz="1200" dirty="0">
+                <a:solidFill>
+                  <a:schemeClr val="bg1"/>
+                </a:solidFill>
+              </a:rPr>
+              <a:t>Acknowledgements</a:t>
+            </a:r>
+          </a:p>
+          <a:p>
+            <a:pPr marL="285750" indent="-285750">
+              <a:buFont typeface="Arial" panose="020B0604020202020204" pitchFamily="34" charset="0"/>
+              <a:buChar char="•"/>
+            </a:pPr>
+            <a:r>
+              <a:rPr lang="en-US" sz="1200" dirty="0" err="1">
+                <a:solidFill>
+                  <a:schemeClr val="bg1"/>
+                </a:solidFill>
+              </a:rPr>
+              <a:t>Moosavi</a:t>
+            </a:r>
+            <a:r>
+              <a:rPr lang="en-US" sz="1200" dirty="0">
+                <a:solidFill>
+                  <a:schemeClr val="bg1"/>
+                </a:solidFill>
+              </a:rPr>
+              <a:t>, </a:t>
+            </a:r>
+            <a:r>
+              <a:rPr lang="en-US" sz="1200" dirty="0" err="1">
+                <a:solidFill>
+                  <a:schemeClr val="bg1"/>
+                </a:solidFill>
+              </a:rPr>
+              <a:t>Sobhan</a:t>
+            </a:r>
+            <a:r>
+              <a:rPr lang="en-US" sz="1200" dirty="0">
+                <a:solidFill>
+                  <a:schemeClr val="bg1"/>
+                </a:solidFill>
+              </a:rPr>
+              <a:t>, Mohammad Hossein </a:t>
+            </a:r>
+            <a:r>
+              <a:rPr lang="en-US" sz="1200" dirty="0" err="1">
+                <a:solidFill>
+                  <a:schemeClr val="bg1"/>
+                </a:solidFill>
+              </a:rPr>
+              <a:t>Samavatian</a:t>
+            </a:r>
+            <a:r>
+              <a:rPr lang="en-US" sz="1200" dirty="0">
+                <a:solidFill>
+                  <a:schemeClr val="bg1"/>
+                </a:solidFill>
+              </a:rPr>
+              <a:t>, Srinivasan Parthasarathy, and Rajiv Ramnath. “</a:t>
+            </a:r>
+            <a:r>
+              <a:rPr lang="en-US" sz="1200" dirty="0">
+                <a:solidFill>
+                  <a:schemeClr val="bg1"/>
+                </a:solidFill>
+                <a:hlinkClick r:id="rId3">
+                  <a:extLst>
+                    <a:ext uri="{A12FA001-AC4F-418D-AE19-62706E023703}">
+                      <ahyp:hlinkClr xmlns:ahyp="http://schemas.microsoft.com/office/drawing/2018/hyperlinkcolor" val="tx"/>
+                    </a:ext>
+                  </a:extLst>
+                </a:hlinkClick>
+              </a:rPr>
+              <a:t>A Countrywide Traffic Accident Dataset</a:t>
+            </a:r>
+            <a:r>
+              <a:rPr lang="en-US" sz="1200" dirty="0">
+                <a:solidFill>
+                  <a:schemeClr val="bg1"/>
+                </a:solidFill>
+              </a:rPr>
+              <a:t>.”, 2019.</a:t>
+            </a:r>
+          </a:p>
+          <a:p>
+            <a:pPr marL="285750" indent="-285750">
+              <a:buFont typeface="Arial" panose="020B0604020202020204" pitchFamily="34" charset="0"/>
+              <a:buChar char="•"/>
+            </a:pPr>
+            <a:r>
+              <a:rPr lang="en-US" sz="1200" dirty="0" err="1">
+                <a:solidFill>
+                  <a:schemeClr val="bg1"/>
+                </a:solidFill>
+              </a:rPr>
+              <a:t>Moosavi</a:t>
+            </a:r>
+            <a:r>
+              <a:rPr lang="en-US" sz="1200" dirty="0">
+                <a:solidFill>
+                  <a:schemeClr val="bg1"/>
+                </a:solidFill>
+              </a:rPr>
+              <a:t>, </a:t>
+            </a:r>
+            <a:r>
+              <a:rPr lang="en-US" sz="1200" dirty="0" err="1">
+                <a:solidFill>
+                  <a:schemeClr val="bg1"/>
+                </a:solidFill>
+              </a:rPr>
+              <a:t>Sobhan</a:t>
+            </a:r>
+            <a:r>
+              <a:rPr lang="en-US" sz="1200" dirty="0">
+                <a:solidFill>
+                  <a:schemeClr val="bg1"/>
+                </a:solidFill>
+              </a:rPr>
+              <a:t>, Mohammad Hossein </a:t>
+            </a:r>
+            <a:r>
+              <a:rPr lang="en-US" sz="1200" dirty="0" err="1">
+                <a:solidFill>
+                  <a:schemeClr val="bg1"/>
+                </a:solidFill>
+              </a:rPr>
+              <a:t>Samavatian</a:t>
+            </a:r>
+            <a:r>
+              <a:rPr lang="en-US" sz="1200" dirty="0">
+                <a:solidFill>
+                  <a:schemeClr val="bg1"/>
+                </a:solidFill>
+              </a:rPr>
+              <a:t>, Srinivasan Parthasarathy, Radu Teodorescu, and Rajiv Ramnath. </a:t>
+            </a:r>
+            <a:r>
+              <a:rPr lang="en-US" sz="1200" dirty="0">
+                <a:solidFill>
+                  <a:schemeClr val="bg1"/>
+                </a:solidFill>
+                <a:hlinkClick r:id="rId4">
+                  <a:extLst>
+                    <a:ext uri="{A12FA001-AC4F-418D-AE19-62706E023703}">
+                      <ahyp:hlinkClr xmlns:ahyp="http://schemas.microsoft.com/office/drawing/2018/hyperlinkcolor" val="tx"/>
+                    </a:ext>
+                  </a:extLst>
+                </a:hlinkClick>
+              </a:rPr>
+              <a:t>"Accident Risk Prediction based on Heterogeneous Sparse Data: New Dataset and Insights."</a:t>
+            </a:r>
+            <a:r>
+              <a:rPr lang="en-US" sz="1200" dirty="0">
+                <a:solidFill>
+                  <a:schemeClr val="bg1"/>
+                </a:solidFill>
+              </a:rPr>
+              <a:t> In proceedings of the 27th ACM SIGSPATIAL International Conference on Advances in Geographic Information Systems, ACM, 2019.</a:t>
+            </a:r>
+          </a:p>
+          <a:p>
+            <a:pPr marL="285750" indent="-285750">
+              <a:buFont typeface="Arial" panose="020B0604020202020204" pitchFamily="34" charset="0"/>
+              <a:buChar char="•"/>
+            </a:pPr>
+            <a:endParaRPr lang="en-US" sz="1200" dirty="0">
+              <a:solidFill>
+                <a:schemeClr val="bg1"/>
+              </a:solidFill>
+            </a:endParaRPr>
+          </a:p>
+          <a:p>
+            <a:pPr marL="285750" indent="-285750">
+              <a:buFont typeface="Arial" panose="020B0604020202020204" pitchFamily="34" charset="0"/>
+              <a:buChar char="•"/>
+            </a:pPr>
+            <a:r>
+              <a:rPr lang="en-US" sz="1200" dirty="0">
+                <a:solidFill>
+                  <a:schemeClr val="bg1"/>
+                </a:solidFill>
+              </a:rPr>
+              <a:t>Accident records include accident severity, start time, end time, latitude and longitude of accident, city, state, zip code, description of accident,  length of road extant affected by accident, street address.</a:t>
+            </a:r>
+          </a:p>
+          <a:p>
+            <a:pPr marL="285750" indent="-285750">
+              <a:buFont typeface="Arial" panose="020B0604020202020204" pitchFamily="34" charset="0"/>
+              <a:buChar char="•"/>
+            </a:pPr>
+            <a:endParaRPr lang="en-US" sz="1200" dirty="0">
+              <a:solidFill>
+                <a:schemeClr val="bg1"/>
+              </a:solidFill>
+            </a:endParaRPr>
+          </a:p>
+          <a:p>
+            <a:r>
+              <a:rPr lang="en-US" dirty="0">
+                <a:solidFill>
+                  <a:schemeClr val="bg1"/>
+                </a:solidFill>
+              </a:rPr>
+              <a:t>Weather Data:  Visual Crossing Weather API (Worldwide weather history reports &amp; global 15-day weather forecasts via CSV download, API, &amp; Excel)</a:t>
+            </a:r>
+          </a:p>
+          <a:p>
+            <a:endParaRPr lang="en-US" sz="1200" dirty="0">
+              <a:solidFill>
+                <a:schemeClr val="bg1"/>
+              </a:solidFill>
+            </a:endParaRPr>
+          </a:p>
+          <a:p>
+            <a:pPr marL="285750" indent="-285750">
+              <a:buFont typeface="Arial" panose="020B0604020202020204" pitchFamily="34" charset="0"/>
+              <a:buChar char="•"/>
+            </a:pPr>
+            <a:endParaRPr lang="en-US" sz="1200" dirty="0">
+              <a:solidFill>
+                <a:schemeClr val="bg1"/>
+              </a:solidFill>
+            </a:endParaRPr>
+          </a:p>
+          <a:p>
+            <a:endParaRPr lang="en-US" dirty="0">
+              <a:solidFill>
+                <a:schemeClr val="bg1"/>
+              </a:solidFill>
+            </a:endParaRPr>
+          </a:p>
+        </p:txBody>
+      </p:sp>
+      <p:pic>
+        <p:nvPicPr>
+          <p:cNvPr id="2050" name="Picture 2">
+            <a:extLst>
+              <a:ext uri="{FF2B5EF4-FFF2-40B4-BE49-F238E27FC236}">
+                <a16:creationId xmlns:a16="http://schemas.microsoft.com/office/drawing/2014/main" id="{CCE1EBC6-D549-4E2E-82FA-AC4C538FA2A6}"/>
+              </a:ext>
+            </a:extLst>
+          </p:cNvPr>
+          <p:cNvPicPr>
+            <a:picLocks noChangeAspect="1" noChangeArrowheads="1"/>
+          </p:cNvPicPr>
+          <p:nvPr/>
+        </p:nvPicPr>
+        <p:blipFill>
+          <a:blip r:embed="rId5" cstate="print">
+            <a:extLst>
+              <a:ext uri="{28A0092B-C50C-407E-A947-70E740481C1C}">
+                <a14:useLocalDpi xmlns:a14="http://schemas.microsoft.com/office/drawing/2010/main" val="0"/>
+              </a:ext>
+            </a:extLst>
+          </a:blip>
+          <a:srcRect/>
+          <a:stretch>
+            <a:fillRect/>
+          </a:stretch>
+        </p:blipFill>
+        <p:spPr bwMode="auto">
+          <a:xfrm>
+            <a:off x="5867400" y="4343400"/>
+            <a:ext cx="2438400" cy="609600"/>
+          </a:xfrm>
+          <a:prstGeom prst="rect">
+            <a:avLst/>
+          </a:prstGeom>
+          <a:noFill/>
+          <a:extLst>
+            <a:ext uri="{909E8E84-426E-40DD-AFC4-6F175D3DCCD1}">
+              <a14:hiddenFill xmlns:a14="http://schemas.microsoft.com/office/drawing/2010/main">
+                <a:solidFill>
+                  <a:srgbClr val="FFFFFF"/>
+                </a:solidFill>
+              </a14:hiddenFill>
+            </a:ext>
+          </a:extLst>
+        </p:spPr>
+      </p:pic>
+      <p:sp>
+        <p:nvSpPr>
+          <p:cNvPr id="3" name="TextBox 2">
+            <a:extLst>
+              <a:ext uri="{FF2B5EF4-FFF2-40B4-BE49-F238E27FC236}">
+                <a16:creationId xmlns:a16="http://schemas.microsoft.com/office/drawing/2014/main" id="{85E18B93-9F2A-4DB0-BB2C-B1BC05BA7DA8}"/>
+              </a:ext>
+            </a:extLst>
+          </p:cNvPr>
+          <p:cNvSpPr txBox="1"/>
+          <p:nvPr/>
+        </p:nvSpPr>
+        <p:spPr>
+          <a:xfrm>
+            <a:off x="211504" y="5345608"/>
+            <a:ext cx="8608646" cy="923330"/>
+          </a:xfrm>
+          <a:prstGeom prst="rect">
+            <a:avLst/>
+          </a:prstGeom>
+          <a:noFill/>
+        </p:spPr>
+        <p:txBody>
+          <a:bodyPr wrap="square" rtlCol="0">
+            <a:spAutoFit/>
+          </a:bodyPr>
+          <a:lstStyle/>
+          <a:p>
+            <a:r>
+              <a:rPr lang="en-US" dirty="0">
+                <a:solidFill>
+                  <a:srgbClr val="FFFF00"/>
+                </a:solidFill>
+              </a:rPr>
+              <a:t>In order to evaluate our questions about Atlanta Traffic and weather we were able to merge our Traffic data with our Weather data on date and then filter to get weather in Atlanta.  From there we filtered the data on zip code to do the bulk of our analysis.</a:t>
+            </a:r>
+          </a:p>
+        </p:txBody>
+      </p:sp>
+    </p:spTree>
+    <p:extLst>
+      <p:ext uri="{BB962C8B-B14F-4D97-AF65-F5344CB8AC3E}">
+        <p14:creationId xmlns:p14="http://schemas.microsoft.com/office/powerpoint/2010/main" val="3306911313"/>
+      </p:ext>
+    </p:extLst>
+  </p:cSld>
+  <p:clrMapOvr>
+    <a:masterClrMapping/>
+  </p:clrMapOvr>
+  <p:transition>
+    <p:fade/>
+  </p:transition>
+</p:sld>
+</file>
+
+<file path=ppt/slides/slide4.xml><?xml version="1.0" encoding="utf-8"?>
+<p:sld xmlns:a="http://schemas.openxmlformats.org/drawingml/2006/main" xmlns:r="http://schemas.openxmlformats.org/officeDocument/2006/relationships" xmlns:p="http://schemas.openxmlformats.org/presentationml/2006/main" showMasterPhAnim="0">
+  <p:cSld>
+    <p:spTree>
+      <p:nvGrpSpPr>
+        <p:cNvPr id="1" name=""/>
+        <p:cNvGrpSpPr/>
+        <p:nvPr/>
+      </p:nvGrpSpPr>
+      <p:grpSpPr>
+        <a:xfrm>
+          <a:off x="0" y="0"/>
+          <a:ext cx="0" cy="0"/>
+          <a:chOff x="0" y="0"/>
+          <a:chExt cx="0" cy="0"/>
+        </a:xfrm>
+      </p:grpSpPr>
+      <p:sp>
+        <p:nvSpPr>
+          <p:cNvPr id="5122" name="Title 1"/>
+          <p:cNvSpPr>
+            <a:spLocks noGrp="1"/>
+          </p:cNvSpPr>
+          <p:nvPr>
+            <p:ph type="title"/>
+          </p:nvPr>
+        </p:nvSpPr>
+        <p:spPr/>
+        <p:txBody>
+          <a:bodyPr/>
+          <a:lstStyle/>
+          <a:p>
+            <a:pPr eaLnBrk="1" hangingPunct="1"/>
+            <a:r>
+              <a:rPr lang="en-US" altLang="en-US" dirty="0">
+                <a:solidFill>
+                  <a:srgbClr val="FFFF00"/>
+                </a:solidFill>
+              </a:rPr>
+              <a:t>Atlanta Traffic</a:t>
+            </a:r>
+          </a:p>
+        </p:txBody>
+      </p:sp>
+      <p:sp>
+        <p:nvSpPr>
+          <p:cNvPr id="4099" name="Content Placeholder 2"/>
+          <p:cNvSpPr>
+            <a:spLocks noGrp="1"/>
+          </p:cNvSpPr>
+          <p:nvPr>
+            <p:ph type="body" idx="1"/>
+          </p:nvPr>
+        </p:nvSpPr>
+        <p:spPr/>
+        <p:txBody>
+          <a:bodyPr/>
+          <a:lstStyle/>
+          <a:p>
+            <a:pPr marL="0" indent="0">
+              <a:buNone/>
+            </a:pPr>
+            <a:br>
+              <a:rPr lang="en-US" dirty="0"/>
+            </a:br>
+            <a:endParaRPr lang="en-US" dirty="0"/>
+          </a:p>
+          <a:p>
+            <a:pPr eaLnBrk="1" hangingPunct="1"/>
+            <a:endParaRPr lang="en-US" altLang="en-US" dirty="0"/>
+          </a:p>
+          <a:p>
+            <a:pPr marL="0" indent="0" eaLnBrk="1" hangingPunct="1">
+              <a:buNone/>
+            </a:pPr>
+            <a:endParaRPr lang="en-US" altLang="en-US" dirty="0"/>
+          </a:p>
+        </p:txBody>
+      </p:sp>
+      <p:pic>
+        <p:nvPicPr>
+          <p:cNvPr id="3074" name="Picture 2">
+            <a:extLst>
+              <a:ext uri="{FF2B5EF4-FFF2-40B4-BE49-F238E27FC236}">
+                <a16:creationId xmlns:a16="http://schemas.microsoft.com/office/drawing/2014/main" id="{553C414F-1441-4142-8F35-94EE34908934}"/>
+              </a:ext>
+            </a:extLst>
+          </p:cNvPr>
+          <p:cNvPicPr>
+            <a:picLocks noChangeAspect="1" noChangeArrowheads="1"/>
+          </p:cNvPicPr>
+          <p:nvPr/>
+        </p:nvPicPr>
+        <p:blipFill>
+          <a:blip r:embed="rId3">
+            <a:extLst>
+              <a:ext uri="{28A0092B-C50C-407E-A947-70E740481C1C}">
+                <a14:useLocalDpi xmlns:a14="http://schemas.microsoft.com/office/drawing/2010/main" val="0"/>
+              </a:ext>
+            </a:extLst>
+          </a:blip>
+          <a:srcRect/>
+          <a:stretch>
+            <a:fillRect/>
+          </a:stretch>
+        </p:blipFill>
+        <p:spPr bwMode="auto">
+          <a:xfrm>
+            <a:off x="152400" y="1485900"/>
+            <a:ext cx="3762375" cy="2705100"/>
+          </a:xfrm>
+          <a:prstGeom prst="rect">
+            <a:avLst/>
+          </a:prstGeom>
+          <a:noFill/>
+          <a:extLst>
+            <a:ext uri="{909E8E84-426E-40DD-AFC4-6F175D3DCCD1}">
+              <a14:hiddenFill xmlns:a14="http://schemas.microsoft.com/office/drawing/2010/main">
+                <a:solidFill>
+                  <a:srgbClr val="FFFFFF"/>
+                </a:solidFill>
+              </a14:hiddenFill>
+            </a:ext>
+          </a:extLst>
+        </p:spPr>
+      </p:pic>
+      <p:sp>
+        <p:nvSpPr>
+          <p:cNvPr id="4" name="Rectangle 3">
+            <a:extLst>
+              <a:ext uri="{FF2B5EF4-FFF2-40B4-BE49-F238E27FC236}">
+                <a16:creationId xmlns:a16="http://schemas.microsoft.com/office/drawing/2014/main" id="{BFC143A1-5F6E-400B-B382-6099F8A65867}"/>
+              </a:ext>
+            </a:extLst>
+          </p:cNvPr>
+          <p:cNvSpPr/>
+          <p:nvPr/>
+        </p:nvSpPr>
+        <p:spPr>
+          <a:xfrm rot="19705031">
+            <a:off x="677371" y="3180578"/>
+            <a:ext cx="9103711" cy="923330"/>
+          </a:xfrm>
+          <a:prstGeom prst="rect">
+            <a:avLst/>
+          </a:prstGeom>
+          <a:noFill/>
+        </p:spPr>
+        <p:txBody>
+          <a:bodyPr wrap="none" lIns="91440" tIns="45720" rIns="91440" bIns="45720">
+            <a:spAutoFit/>
+          </a:bodyPr>
+          <a:lstStyle/>
+          <a:p>
+            <a:pPr algn="ctr"/>
+            <a:r>
+              <a:rPr lang="en-US" sz="5400" b="0" cap="none" spc="0" dirty="0">
+                <a:ln w="0"/>
+                <a:solidFill>
+                  <a:schemeClr val="tx1"/>
+                </a:solidFill>
+                <a:effectLst>
+                  <a:outerShdw blurRad="38100" dist="19050" dir="2700000" algn="tl" rotWithShape="0">
+                    <a:schemeClr val="dk1">
+                      <a:alpha val="40000"/>
+                    </a:schemeClr>
+                  </a:outerShdw>
+                </a:effectLst>
+              </a:rPr>
+              <a:t>Add Amber’s Heatmap here too</a:t>
+            </a:r>
+          </a:p>
+        </p:txBody>
+      </p:sp>
+    </p:spTree>
+    <p:extLst>
+      <p:ext uri="{BB962C8B-B14F-4D97-AF65-F5344CB8AC3E}">
+        <p14:creationId xmlns:p14="http://schemas.microsoft.com/office/powerpoint/2010/main" val="327570418"/>
+      </p:ext>
+    </p:extLst>
+  </p:cSld>
+  <p:clrMapOvr>
+    <a:masterClrMapping/>
+  </p:clrMapOvr>
+  <p:transition>
+    <p:fade/>
+  </p:transition>
+</p:sld>
+</file>
+
+<file path=ppt/slides/slide5.xml><?xml version="1.0" encoding="utf-8"?>
+<p:sld xmlns:a="http://schemas.openxmlformats.org/drawingml/2006/main" xmlns:r="http://schemas.openxmlformats.org/officeDocument/2006/relationships" xmlns:p="http://schemas.openxmlformats.org/presentationml/2006/main" showMasterPhAnim="0">
+  <p:cSld>
+    <p:spTree>
+      <p:nvGrpSpPr>
+        <p:cNvPr id="1" name=""/>
+        <p:cNvGrpSpPr/>
+        <p:nvPr/>
+      </p:nvGrpSpPr>
+      <p:grpSpPr>
+        <a:xfrm>
+          <a:off x="0" y="0"/>
+          <a:ext cx="0" cy="0"/>
+          <a:chOff x="0" y="0"/>
+          <a:chExt cx="0" cy="0"/>
+        </a:xfrm>
+      </p:grpSpPr>
+      <p:sp>
+        <p:nvSpPr>
+          <p:cNvPr id="5122" name="Title 1"/>
+          <p:cNvSpPr>
+            <a:spLocks noGrp="1"/>
+          </p:cNvSpPr>
+          <p:nvPr>
+            <p:ph type="title"/>
+          </p:nvPr>
+        </p:nvSpPr>
+        <p:spPr/>
+        <p:txBody>
+          <a:bodyPr/>
+          <a:lstStyle/>
+          <a:p>
+            <a:pPr eaLnBrk="1" hangingPunct="1"/>
+            <a:r>
+              <a:rPr lang="en-US" altLang="en-US" dirty="0">
+                <a:solidFill>
+                  <a:srgbClr val="FFFF00"/>
+                </a:solidFill>
+              </a:rPr>
+              <a:t>Atlanta Weather</a:t>
+            </a:r>
+          </a:p>
+        </p:txBody>
+      </p:sp>
+      <p:sp>
+        <p:nvSpPr>
+          <p:cNvPr id="4099" name="Content Placeholder 2"/>
+          <p:cNvSpPr>
+            <a:spLocks noGrp="1"/>
+          </p:cNvSpPr>
+          <p:nvPr>
+            <p:ph type="body" idx="1"/>
+          </p:nvPr>
+        </p:nvSpPr>
+        <p:spPr/>
+        <p:txBody>
+          <a:bodyPr/>
+          <a:lstStyle/>
+          <a:p>
+            <a:pPr marL="0" indent="0">
+              <a:buNone/>
+            </a:pPr>
+            <a:br>
+              <a:rPr lang="en-US" dirty="0"/>
+            </a:br>
+            <a:endParaRPr lang="en-US" dirty="0"/>
+          </a:p>
+          <a:p>
+            <a:pPr eaLnBrk="1" hangingPunct="1"/>
+            <a:endParaRPr lang="en-US" altLang="en-US" dirty="0"/>
+          </a:p>
+          <a:p>
+            <a:pPr marL="0" indent="0" eaLnBrk="1" hangingPunct="1">
+              <a:buNone/>
+            </a:pPr>
+            <a:endParaRPr lang="en-US" altLang="en-US" dirty="0"/>
+          </a:p>
+        </p:txBody>
+      </p:sp>
+      <p:pic>
+        <p:nvPicPr>
+          <p:cNvPr id="4098" name="Picture 2">
+            <a:extLst>
+              <a:ext uri="{FF2B5EF4-FFF2-40B4-BE49-F238E27FC236}">
+                <a16:creationId xmlns:a16="http://schemas.microsoft.com/office/drawing/2014/main" id="{864E04A0-23F3-484B-80D0-8F46E9443C0F}"/>
+              </a:ext>
+            </a:extLst>
+          </p:cNvPr>
+          <p:cNvPicPr>
+            <a:picLocks noChangeAspect="1" noChangeArrowheads="1"/>
+          </p:cNvPicPr>
+          <p:nvPr/>
+        </p:nvPicPr>
+        <p:blipFill>
+          <a:blip r:embed="rId3">
+            <a:extLst>
+              <a:ext uri="{28A0092B-C50C-407E-A947-70E740481C1C}">
+                <a14:useLocalDpi xmlns:a14="http://schemas.microsoft.com/office/drawing/2010/main" val="0"/>
+              </a:ext>
+            </a:extLst>
+          </a:blip>
+          <a:srcRect/>
+          <a:stretch>
+            <a:fillRect/>
+          </a:stretch>
+        </p:blipFill>
+        <p:spPr bwMode="auto">
+          <a:xfrm>
+            <a:off x="228600" y="1485900"/>
+            <a:ext cx="3705225" cy="2705100"/>
+          </a:xfrm>
+          <a:prstGeom prst="rect">
+            <a:avLst/>
+          </a:prstGeom>
+          <a:noFill/>
+          <a:extLst>
+            <a:ext uri="{909E8E84-426E-40DD-AFC4-6F175D3DCCD1}">
+              <a14:hiddenFill xmlns:a14="http://schemas.microsoft.com/office/drawing/2010/main">
+                <a:solidFill>
+                  <a:srgbClr val="FFFFFF"/>
+                </a:solidFill>
+              </a14:hiddenFill>
+            </a:ext>
+          </a:extLst>
+        </p:spPr>
+      </p:pic>
+      <p:pic>
+        <p:nvPicPr>
+          <p:cNvPr id="4100" name="Picture 4">
+            <a:extLst>
+              <a:ext uri="{FF2B5EF4-FFF2-40B4-BE49-F238E27FC236}">
+                <a16:creationId xmlns:a16="http://schemas.microsoft.com/office/drawing/2014/main" id="{7EBB7612-CE0E-4DF0-A93B-39CC610F6A6B}"/>
+              </a:ext>
+            </a:extLst>
+          </p:cNvPr>
+          <p:cNvPicPr>
+            <a:picLocks noChangeAspect="1" noChangeArrowheads="1"/>
+          </p:cNvPicPr>
+          <p:nvPr/>
+        </p:nvPicPr>
+        <p:blipFill>
+          <a:blip r:embed="rId4">
+            <a:extLst>
+              <a:ext uri="{28A0092B-C50C-407E-A947-70E740481C1C}">
+                <a14:useLocalDpi xmlns:a14="http://schemas.microsoft.com/office/drawing/2010/main" val="0"/>
+              </a:ext>
+            </a:extLst>
+          </a:blip>
+          <a:srcRect/>
+          <a:stretch>
+            <a:fillRect/>
+          </a:stretch>
+        </p:blipFill>
+        <p:spPr bwMode="auto">
+          <a:xfrm>
+            <a:off x="4724400" y="3352800"/>
+            <a:ext cx="3638550" cy="2705100"/>
+          </a:xfrm>
+          <a:prstGeom prst="rect">
+            <a:avLst/>
+          </a:prstGeom>
+          <a:noFill/>
+          <a:extLst>
+            <a:ext uri="{909E8E84-426E-40DD-AFC4-6F175D3DCCD1}">
+              <a14:hiddenFill xmlns:a14="http://schemas.microsoft.com/office/drawing/2010/main">
+                <a:solidFill>
+                  <a:srgbClr val="FFFFFF"/>
+                </a:solidFill>
+              </a14:hiddenFill>
+            </a:ext>
+          </a:extLst>
+        </p:spPr>
+      </p:pic>
+    </p:spTree>
+    <p:extLst>
+      <p:ext uri="{BB962C8B-B14F-4D97-AF65-F5344CB8AC3E}">
+        <p14:creationId xmlns:p14="http://schemas.microsoft.com/office/powerpoint/2010/main" val="786681499"/>
+      </p:ext>
+    </p:extLst>
+  </p:cSld>
+  <p:clrMapOvr>
+    <a:masterClrMapping/>
+  </p:clrMapOvr>
+  <p:transition>
+    <p:fade/>
+  </p:transition>
+</p:sld>
+</file>
+
+<file path=ppt/slides/slide6.xml><?xml version="1.0" encoding="utf-8"?>
+<p:sld xmlns:a="http://schemas.openxmlformats.org/drawingml/2006/main" xmlns:r="http://schemas.openxmlformats.org/officeDocument/2006/relationships" xmlns:p="http://schemas.openxmlformats.org/presentationml/2006/main" showMasterPhAnim="0">
+  <p:cSld>
+    <p:spTree>
+      <p:nvGrpSpPr>
+        <p:cNvPr id="1" name=""/>
+        <p:cNvGrpSpPr/>
+        <p:nvPr/>
+      </p:nvGrpSpPr>
+      <p:grpSpPr>
+        <a:xfrm>
+          <a:off x="0" y="0"/>
+          <a:ext cx="0" cy="0"/>
+          <a:chOff x="0" y="0"/>
+          <a:chExt cx="0" cy="0"/>
+        </a:xfrm>
+      </p:grpSpPr>
+      <p:sp>
+        <p:nvSpPr>
+          <p:cNvPr id="5122" name="Title 1"/>
+          <p:cNvSpPr>
+            <a:spLocks noGrp="1"/>
+          </p:cNvSpPr>
+          <p:nvPr>
+            <p:ph type="title"/>
+          </p:nvPr>
+        </p:nvSpPr>
+        <p:spPr/>
+        <p:txBody>
+          <a:bodyPr/>
+          <a:lstStyle/>
+          <a:p>
+            <a:pPr eaLnBrk="1" hangingPunct="1"/>
+            <a:r>
+              <a:rPr lang="en-US" altLang="en-US" dirty="0">
+                <a:solidFill>
+                  <a:srgbClr val="FFFF00"/>
+                </a:solidFill>
+              </a:rPr>
+              <a:t>Atlanta Traffic and Weather</a:t>
+            </a:r>
+          </a:p>
+        </p:txBody>
+      </p:sp>
+      <p:sp>
+        <p:nvSpPr>
+          <p:cNvPr id="4099" name="Content Placeholder 2"/>
+          <p:cNvSpPr>
+            <a:spLocks noGrp="1"/>
+          </p:cNvSpPr>
+          <p:nvPr>
+            <p:ph type="body" idx="1"/>
+          </p:nvPr>
+        </p:nvSpPr>
+        <p:spPr/>
+        <p:txBody>
+          <a:bodyPr/>
+          <a:lstStyle/>
+          <a:p>
+            <a:r>
+              <a:rPr lang="en-US" dirty="0"/>
+              <a:t>Data Analysis</a:t>
+            </a:r>
+            <a:br>
+              <a:rPr lang="en-US" dirty="0"/>
+            </a:br>
+            <a:br>
+              <a:rPr lang="en-US" dirty="0"/>
+            </a:br>
+            <a:r>
+              <a:rPr lang="en-US" dirty="0"/>
+              <a:t>  * Discuss the steps you took to analyze the data and answer each question you asked in your proposal</a:t>
+            </a:r>
+            <a:br>
+              <a:rPr lang="en-US" dirty="0"/>
+            </a:br>
+            <a:r>
+              <a:rPr lang="en-US" dirty="0"/>
+              <a:t>  * Present and discuss interesting figures developed during analysis, ideally with the help of </a:t>
+            </a:r>
+            <a:r>
+              <a:rPr lang="en-US" dirty="0" err="1"/>
+              <a:t>Jupyter</a:t>
+            </a:r>
+            <a:r>
+              <a:rPr lang="en-US" dirty="0"/>
+              <a:t> Notebook</a:t>
+            </a:r>
+            <a:br>
+              <a:rPr lang="en-US" dirty="0"/>
+            </a:br>
+            <a:endParaRPr lang="en-US" dirty="0"/>
+          </a:p>
+          <a:p>
+            <a:pPr marL="0" indent="0">
+              <a:buNone/>
+            </a:pPr>
+            <a:br>
+              <a:rPr lang="en-US" dirty="0"/>
+            </a:br>
+            <a:endParaRPr lang="en-US" dirty="0"/>
+          </a:p>
+          <a:p>
+            <a:pPr eaLnBrk="1" hangingPunct="1"/>
+            <a:endParaRPr lang="en-US" altLang="en-US" dirty="0"/>
+          </a:p>
+          <a:p>
+            <a:pPr marL="0" indent="0" eaLnBrk="1" hangingPunct="1">
+              <a:buNone/>
+            </a:pPr>
+            <a:endParaRPr lang="en-US" altLang="en-US" dirty="0"/>
+          </a:p>
+        </p:txBody>
+      </p:sp>
+    </p:spTree>
+    <p:extLst>
+      <p:ext uri="{BB962C8B-B14F-4D97-AF65-F5344CB8AC3E}">
+        <p14:creationId xmlns:p14="http://schemas.microsoft.com/office/powerpoint/2010/main" val="1207128966"/>
+      </p:ext>
+    </p:extLst>
+  </p:cSld>
+  <p:clrMapOvr>
+    <a:masterClrMapping/>
+  </p:clrMapOvr>
+  <p:transition>
+    <p:fade/>
+  </p:transition>
+</p:sld>
+</file>
+
+<file path=ppt/slides/slide7.xml><?xml version="1.0" encoding="utf-8"?>
+<p:sld xmlns:a="http://schemas.openxmlformats.org/drawingml/2006/main" xmlns:r="http://schemas.openxmlformats.org/officeDocument/2006/relationships" xmlns:p="http://schemas.openxmlformats.org/presentationml/2006/main" showMasterPhAnim="0">
+  <p:cSld>
+    <p:spTree>
+      <p:nvGrpSpPr>
+        <p:cNvPr id="1" name=""/>
+        <p:cNvGrpSpPr/>
+        <p:nvPr/>
+      </p:nvGrpSpPr>
+      <p:grpSpPr>
+        <a:xfrm>
+          <a:off x="0" y="0"/>
+          <a:ext cx="0" cy="0"/>
+          <a:chOff x="0" y="0"/>
+          <a:chExt cx="0" cy="0"/>
+        </a:xfrm>
+      </p:grpSpPr>
+      <p:sp>
+        <p:nvSpPr>
+          <p:cNvPr id="5122" name="Title 1"/>
+          <p:cNvSpPr>
+            <a:spLocks noGrp="1"/>
+          </p:cNvSpPr>
+          <p:nvPr>
+            <p:ph type="title"/>
+          </p:nvPr>
+        </p:nvSpPr>
+        <p:spPr/>
+        <p:txBody>
+          <a:bodyPr/>
+          <a:lstStyle/>
+          <a:p>
+            <a:pPr eaLnBrk="1" hangingPunct="1"/>
+            <a:r>
+              <a:rPr lang="en-US" altLang="en-US" dirty="0">
+                <a:solidFill>
+                  <a:srgbClr val="FFFF00"/>
+                </a:solidFill>
+              </a:rPr>
+              <a:t>Atlanta Traffic and Weather</a:t>
+            </a:r>
+          </a:p>
+        </p:txBody>
+      </p:sp>
+      <p:sp>
+        <p:nvSpPr>
+          <p:cNvPr id="4099" name="Content Placeholder 2"/>
+          <p:cNvSpPr>
+            <a:spLocks noGrp="1"/>
+          </p:cNvSpPr>
+          <p:nvPr>
+            <p:ph type="body" idx="1"/>
+          </p:nvPr>
+        </p:nvSpPr>
+        <p:spPr/>
+        <p:txBody>
+          <a:bodyPr/>
+          <a:lstStyle/>
+          <a:p>
+            <a:r>
+              <a:rPr lang="en-US" dirty="0"/>
+              <a:t>Discussion</a:t>
+            </a:r>
+            <a:br>
+              <a:rPr lang="en-US" dirty="0"/>
+            </a:br>
+            <a:br>
+              <a:rPr lang="en-US" dirty="0"/>
+            </a:br>
+            <a:r>
+              <a:rPr lang="en-US" dirty="0"/>
+              <a:t>  * Discuss your findings. Did you find what you expected to find? If not, why not? What inferences or general conclusions can you draw from your analysis?</a:t>
+            </a:r>
+            <a:br>
+              <a:rPr lang="en-US" dirty="0"/>
+            </a:br>
+            <a:br>
+              <a:rPr lang="en-US" dirty="0"/>
+            </a:br>
+            <a:endParaRPr lang="en-US" dirty="0"/>
+          </a:p>
+          <a:p>
+            <a:pPr marL="0" indent="0">
+              <a:buNone/>
+            </a:pPr>
+            <a:br>
+              <a:rPr lang="en-US" dirty="0"/>
+            </a:br>
+            <a:endParaRPr lang="en-US" dirty="0"/>
+          </a:p>
+          <a:p>
+            <a:pPr eaLnBrk="1" hangingPunct="1"/>
+            <a:endParaRPr lang="en-US" altLang="en-US" dirty="0"/>
+          </a:p>
+          <a:p>
+            <a:pPr marL="0" indent="0" eaLnBrk="1" hangingPunct="1">
+              <a:buNone/>
+            </a:pPr>
+            <a:endParaRPr lang="en-US" altLang="en-US" dirty="0"/>
+          </a:p>
+        </p:txBody>
+      </p:sp>
+    </p:spTree>
+    <p:extLst>
+      <p:ext uri="{BB962C8B-B14F-4D97-AF65-F5344CB8AC3E}">
+        <p14:creationId xmlns:p14="http://schemas.microsoft.com/office/powerpoint/2010/main" val="2091579156"/>
+      </p:ext>
+    </p:extLst>
+  </p:cSld>
+  <p:clrMapOvr>
+    <a:masterClrMapping/>
+  </p:clrMapOvr>
+  <p:transition>
+    <p:fade/>
+  </p:transition>
+</p:sld>
+</file>
+
+<file path=ppt/slides/slide8.xml><?xml version="1.0" encoding="utf-8"?>
+<p:sld xmlns:a="http://schemas.openxmlformats.org/drawingml/2006/main" xmlns:r="http://schemas.openxmlformats.org/officeDocument/2006/relationships" xmlns:p="http://schemas.openxmlformats.org/presentationml/2006/main" showMasterPhAnim="0">
+  <p:cSld>
+    <p:spTree>
+      <p:nvGrpSpPr>
+        <p:cNvPr id="1" name=""/>
+        <p:cNvGrpSpPr/>
+        <p:nvPr/>
+      </p:nvGrpSpPr>
+      <p:grpSpPr>
+        <a:xfrm>
+          <a:off x="0" y="0"/>
+          <a:ext cx="0" cy="0"/>
+          <a:chOff x="0" y="0"/>
+          <a:chExt cx="0" cy="0"/>
+        </a:xfrm>
+      </p:grpSpPr>
+      <p:sp>
+        <p:nvSpPr>
+          <p:cNvPr id="5122" name="Title 1"/>
+          <p:cNvSpPr>
+            <a:spLocks noGrp="1"/>
+          </p:cNvSpPr>
+          <p:nvPr>
+            <p:ph type="title"/>
+          </p:nvPr>
+        </p:nvSpPr>
+        <p:spPr/>
+        <p:txBody>
+          <a:bodyPr/>
+          <a:lstStyle/>
+          <a:p>
+            <a:pPr eaLnBrk="1" hangingPunct="1"/>
+            <a:r>
+              <a:rPr lang="en-US" altLang="en-US" dirty="0">
+                <a:solidFill>
+                  <a:srgbClr val="FFFF00"/>
+                </a:solidFill>
+              </a:rPr>
+              <a:t>Atlanta Traffic and Weather</a:t>
+            </a:r>
+          </a:p>
+        </p:txBody>
+      </p:sp>
+      <p:sp>
+        <p:nvSpPr>
+          <p:cNvPr id="4099" name="Content Placeholder 2"/>
+          <p:cNvSpPr>
+            <a:spLocks noGrp="1"/>
+          </p:cNvSpPr>
+          <p:nvPr>
+            <p:ph type="body" idx="1"/>
+          </p:nvPr>
+        </p:nvSpPr>
+        <p:spPr/>
+        <p:txBody>
+          <a:bodyPr/>
+          <a:lstStyle/>
+          <a:p>
+            <a:r>
+              <a:rPr lang="en-US" dirty="0"/>
+              <a:t>Discussion</a:t>
+            </a:r>
+            <a:br>
+              <a:rPr lang="en-US" dirty="0"/>
+            </a:br>
+            <a:br>
+              <a:rPr lang="en-US" dirty="0"/>
+            </a:br>
+            <a:r>
+              <a:rPr lang="en-US" dirty="0"/>
+              <a:t>  * Discuss your findings. Did you find what you expected to find? If not, why not? What inferences or general conclusions can you draw from your analysis?</a:t>
+            </a:r>
+            <a:br>
+              <a:rPr lang="en-US" dirty="0"/>
+            </a:br>
+            <a:br>
+              <a:rPr lang="en-US" dirty="0"/>
+            </a:br>
+            <a:endParaRPr lang="en-US" dirty="0"/>
+          </a:p>
+          <a:p>
+            <a:pPr marL="0" indent="0">
+              <a:buNone/>
+            </a:pPr>
+            <a:br>
+              <a:rPr lang="en-US" dirty="0"/>
+            </a:br>
+            <a:endParaRPr lang="en-US" dirty="0"/>
+          </a:p>
+          <a:p>
+            <a:pPr eaLnBrk="1" hangingPunct="1"/>
+            <a:endParaRPr lang="en-US" altLang="en-US" dirty="0"/>
+          </a:p>
+          <a:p>
+            <a:pPr marL="0" indent="0" eaLnBrk="1" hangingPunct="1">
+              <a:buNone/>
+            </a:pPr>
+            <a:endParaRPr lang="en-US" altLang="en-US" dirty="0"/>
+          </a:p>
+        </p:txBody>
+      </p:sp>
+    </p:spTree>
+    <p:extLst>
+      <p:ext uri="{BB962C8B-B14F-4D97-AF65-F5344CB8AC3E}">
+        <p14:creationId xmlns:p14="http://schemas.microsoft.com/office/powerpoint/2010/main" val="2637632119"/>
+      </p:ext>
+    </p:extLst>
+  </p:cSld>
+  <p:clrMapOvr>
+    <a:masterClrMapping/>
+  </p:clrMapOvr>
+  <p:transition>
+    <p:fade/>
+  </p:transition>
+</p:sld>
+</file>
+
+<file path=ppt/slides/slide9.xml><?xml version="1.0" encoding="utf-8"?>
+<p:sld xmlns:a="http://schemas.openxmlformats.org/drawingml/2006/main" xmlns:r="http://schemas.openxmlformats.org/officeDocument/2006/relationships" xmlns:p="http://schemas.openxmlformats.org/presentationml/2006/main" showMasterPhAnim="0">
+  <p:cSld>
+    <p:spTree>
+      <p:nvGrpSpPr>
+        <p:cNvPr id="1" name=""/>
+        <p:cNvGrpSpPr/>
+        <p:nvPr/>
+      </p:nvGrpSpPr>
+      <p:grpSpPr>
+        <a:xfrm>
+          <a:off x="0" y="0"/>
+          <a:ext cx="0" cy="0"/>
+          <a:chOff x="0" y="0"/>
+          <a:chExt cx="0" cy="0"/>
+        </a:xfrm>
+      </p:grpSpPr>
+      <p:sp>
+        <p:nvSpPr>
+          <p:cNvPr id="5122" name="Title 1"/>
+          <p:cNvSpPr>
+            <a:spLocks noGrp="1"/>
+          </p:cNvSpPr>
+          <p:nvPr>
+            <p:ph type="title"/>
+          </p:nvPr>
+        </p:nvSpPr>
+        <p:spPr/>
+        <p:txBody>
+          <a:bodyPr/>
+          <a:lstStyle/>
+          <a:p>
+            <a:pPr eaLnBrk="1" hangingPunct="1"/>
+            <a:r>
+              <a:rPr lang="en-US" altLang="en-US" dirty="0">
+                <a:solidFill>
+                  <a:srgbClr val="FFFF00"/>
+                </a:solidFill>
+              </a:rPr>
+              <a:t>Atlanta Traffic and Weather</a:t>
+            </a:r>
+          </a:p>
+        </p:txBody>
+      </p:sp>
+      <p:sp>
+        <p:nvSpPr>
+          <p:cNvPr id="4099" name="Content Placeholder 2"/>
+          <p:cNvSpPr>
+            <a:spLocks noGrp="1"/>
+          </p:cNvSpPr>
+          <p:nvPr>
+            <p:ph type="body" idx="1"/>
+          </p:nvPr>
+        </p:nvSpPr>
+        <p:spPr/>
+        <p:txBody>
+          <a:bodyPr/>
+          <a:lstStyle/>
+          <a:p>
+            <a:pPr marL="0" indent="0">
+              <a:buNone/>
+            </a:pPr>
+            <a:r>
+              <a:rPr lang="en-US" dirty="0"/>
+              <a:t>Post Mortem</a:t>
+            </a:r>
+            <a:br>
+              <a:rPr lang="en-US" dirty="0"/>
+            </a:br>
+            <a:br>
+              <a:rPr lang="en-US" dirty="0"/>
+            </a:br>
+            <a:r>
+              <a:rPr lang="en-US" dirty="0"/>
+              <a:t>  * Discuss any difficulties that arose, and how you dealt with them</a:t>
+            </a:r>
+            <a:br>
+              <a:rPr lang="en-US" dirty="0"/>
+            </a:br>
+            <a:r>
+              <a:rPr lang="en-US" dirty="0"/>
+              <a:t>  * Discuss any additional questions that came up, but which you didn't have time to answer: What would you research next, if you had two more weeks?</a:t>
+            </a:r>
+            <a:br>
+              <a:rPr lang="en-US" dirty="0"/>
+            </a:br>
+            <a:endParaRPr lang="en-US" dirty="0"/>
+          </a:p>
+          <a:p>
+            <a:pPr marL="0" indent="0">
+              <a:buNone/>
+            </a:pPr>
+            <a:br>
+              <a:rPr lang="en-US" dirty="0"/>
+            </a:br>
+            <a:endParaRPr lang="en-US" dirty="0"/>
+          </a:p>
+          <a:p>
+            <a:pPr eaLnBrk="1" hangingPunct="1"/>
+            <a:endParaRPr lang="en-US" altLang="en-US" dirty="0"/>
+          </a:p>
+          <a:p>
+            <a:pPr marL="0" indent="0" eaLnBrk="1" hangingPunct="1">
+              <a:buNone/>
+            </a:pPr>
+            <a:endParaRPr lang="en-US" altLang="en-US" dirty="0"/>
+          </a:p>
+        </p:txBody>
+      </p:sp>
+    </p:spTree>
+    <p:extLst>
+      <p:ext uri="{BB962C8B-B14F-4D97-AF65-F5344CB8AC3E}">
+        <p14:creationId xmlns:p14="http://schemas.microsoft.com/office/powerpoint/2010/main" val="785741929"/>
+      </p:ext>
+    </p:extLst>
+  </p:cSld>
+  <p:clrMapOvr>
+    <a:masterClrMapping/>
+  </p:clrMapOvr>
+  <p:transition>
+    <p:fade/>
+  </p:transition>
 </p:sld>
 </file>
 

</xml_diff>